<commit_message>
Fixed Config Folder Connection. (#153)
There was a problem where setting the `Generellem.SubFolder` property resulted in a SQLite exception. The reason is that SQLite isn't able to create new folders on it's own. So, I put that check in where I get the path for configuration to check and create that folder if it isn't there.
</commit_message>
<xml_diff>
--- a/Documentation/AcronymSoup.pptx
+++ b/Documentation/AcronymSoup.pptx
@@ -1056,7 +1056,1046 @@
 </dgm:colorsDef>
 </file>
 
+<file path=ppt/diagrams/colors2.xml><?xml version="1.0" encoding="utf-8"?>
+<dgm:colorsDef xmlns:dgm="http://schemas.openxmlformats.org/drawingml/2006/diagram" xmlns:a="http://schemas.openxmlformats.org/drawingml/2006/main" uniqueId="urn:microsoft.com/office/officeart/2005/8/colors/accent1_2">
+  <dgm:title val=""/>
+  <dgm:desc val=""/>
+  <dgm:catLst>
+    <dgm:cat type="accent1" pri="11200"/>
+  </dgm:catLst>
+  <dgm:styleLbl name="node0">
+    <dgm:fillClrLst meth="repeat">
+      <a:schemeClr val="accent1"/>
+    </dgm:fillClrLst>
+    <dgm:linClrLst meth="repeat">
+      <a:schemeClr val="lt1"/>
+    </dgm:linClrLst>
+    <dgm:effectClrLst/>
+    <dgm:txLinClrLst/>
+    <dgm:txFillClrLst/>
+    <dgm:txEffectClrLst/>
+  </dgm:styleLbl>
+  <dgm:styleLbl name="alignNode1">
+    <dgm:fillClrLst meth="repeat">
+      <a:schemeClr val="accent1"/>
+    </dgm:fillClrLst>
+    <dgm:linClrLst meth="repeat">
+      <a:schemeClr val="accent1"/>
+    </dgm:linClrLst>
+    <dgm:effectClrLst/>
+    <dgm:txLinClrLst/>
+    <dgm:txFillClrLst/>
+    <dgm:txEffectClrLst/>
+  </dgm:styleLbl>
+  <dgm:styleLbl name="node1">
+    <dgm:fillClrLst meth="repeat">
+      <a:schemeClr val="accent1"/>
+    </dgm:fillClrLst>
+    <dgm:linClrLst meth="repeat">
+      <a:schemeClr val="lt1"/>
+    </dgm:linClrLst>
+    <dgm:effectClrLst/>
+    <dgm:txLinClrLst/>
+    <dgm:txFillClrLst/>
+    <dgm:txEffectClrLst/>
+  </dgm:styleLbl>
+  <dgm:styleLbl name="lnNode1">
+    <dgm:fillClrLst meth="repeat">
+      <a:schemeClr val="accent1"/>
+    </dgm:fillClrLst>
+    <dgm:linClrLst meth="repeat">
+      <a:schemeClr val="lt1"/>
+    </dgm:linClrLst>
+    <dgm:effectClrLst/>
+    <dgm:txLinClrLst/>
+    <dgm:txFillClrLst/>
+    <dgm:txEffectClrLst/>
+  </dgm:styleLbl>
+  <dgm:styleLbl name="vennNode1">
+    <dgm:fillClrLst meth="repeat">
+      <a:schemeClr val="accent1">
+        <a:alpha val="50000"/>
+      </a:schemeClr>
+    </dgm:fillClrLst>
+    <dgm:linClrLst meth="repeat">
+      <a:schemeClr val="lt1"/>
+    </dgm:linClrLst>
+    <dgm:effectClrLst/>
+    <dgm:txLinClrLst/>
+    <dgm:txFillClrLst/>
+    <dgm:txEffectClrLst/>
+  </dgm:styleLbl>
+  <dgm:styleLbl name="node2">
+    <dgm:fillClrLst meth="repeat">
+      <a:schemeClr val="accent1"/>
+    </dgm:fillClrLst>
+    <dgm:linClrLst meth="repeat">
+      <a:schemeClr val="lt1"/>
+    </dgm:linClrLst>
+    <dgm:effectClrLst/>
+    <dgm:txLinClrLst/>
+    <dgm:txFillClrLst/>
+    <dgm:txEffectClrLst/>
+  </dgm:styleLbl>
+  <dgm:styleLbl name="node3">
+    <dgm:fillClrLst meth="repeat">
+      <a:schemeClr val="accent1"/>
+    </dgm:fillClrLst>
+    <dgm:linClrLst meth="repeat">
+      <a:schemeClr val="lt1"/>
+    </dgm:linClrLst>
+    <dgm:effectClrLst/>
+    <dgm:txLinClrLst/>
+    <dgm:txFillClrLst/>
+    <dgm:txEffectClrLst/>
+  </dgm:styleLbl>
+  <dgm:styleLbl name="node4">
+    <dgm:fillClrLst meth="repeat">
+      <a:schemeClr val="accent1"/>
+    </dgm:fillClrLst>
+    <dgm:linClrLst meth="repeat">
+      <a:schemeClr val="lt1"/>
+    </dgm:linClrLst>
+    <dgm:effectClrLst/>
+    <dgm:txLinClrLst/>
+    <dgm:txFillClrLst/>
+    <dgm:txEffectClrLst/>
+  </dgm:styleLbl>
+  <dgm:styleLbl name="fgImgPlace1">
+    <dgm:fillClrLst meth="repeat">
+      <a:schemeClr val="accent1">
+        <a:tint val="50000"/>
+      </a:schemeClr>
+    </dgm:fillClrLst>
+    <dgm:linClrLst meth="repeat">
+      <a:schemeClr val="lt1"/>
+    </dgm:linClrLst>
+    <dgm:effectClrLst/>
+    <dgm:txLinClrLst/>
+    <dgm:txFillClrLst meth="repeat">
+      <a:schemeClr val="lt1"/>
+    </dgm:txFillClrLst>
+    <dgm:txEffectClrLst/>
+  </dgm:styleLbl>
+  <dgm:styleLbl name="alignImgPlace1">
+    <dgm:fillClrLst meth="repeat">
+      <a:schemeClr val="accent1">
+        <a:tint val="50000"/>
+      </a:schemeClr>
+    </dgm:fillClrLst>
+    <dgm:linClrLst meth="repeat">
+      <a:schemeClr val="lt1"/>
+    </dgm:linClrLst>
+    <dgm:effectClrLst/>
+    <dgm:txLinClrLst/>
+    <dgm:txFillClrLst meth="repeat">
+      <a:schemeClr val="lt1"/>
+    </dgm:txFillClrLst>
+    <dgm:txEffectClrLst/>
+  </dgm:styleLbl>
+  <dgm:styleLbl name="bgImgPlace1">
+    <dgm:fillClrLst meth="repeat">
+      <a:schemeClr val="accent1">
+        <a:tint val="50000"/>
+      </a:schemeClr>
+    </dgm:fillClrLst>
+    <dgm:linClrLst meth="repeat">
+      <a:schemeClr val="lt1"/>
+    </dgm:linClrLst>
+    <dgm:effectClrLst/>
+    <dgm:txLinClrLst/>
+    <dgm:txFillClrLst meth="repeat">
+      <a:schemeClr val="lt1"/>
+    </dgm:txFillClrLst>
+    <dgm:txEffectClrLst/>
+  </dgm:styleLbl>
+  <dgm:styleLbl name="sibTrans2D1">
+    <dgm:fillClrLst meth="repeat">
+      <a:schemeClr val="accent1">
+        <a:tint val="60000"/>
+      </a:schemeClr>
+    </dgm:fillClrLst>
+    <dgm:linClrLst meth="repeat">
+      <a:schemeClr val="accent1">
+        <a:tint val="60000"/>
+      </a:schemeClr>
+    </dgm:linClrLst>
+    <dgm:effectClrLst/>
+    <dgm:txLinClrLst/>
+    <dgm:txFillClrLst/>
+    <dgm:txEffectClrLst/>
+  </dgm:styleLbl>
+  <dgm:styleLbl name="fgSibTrans2D1">
+    <dgm:fillClrLst meth="repeat">
+      <a:schemeClr val="accent1">
+        <a:tint val="60000"/>
+      </a:schemeClr>
+    </dgm:fillClrLst>
+    <dgm:linClrLst meth="repeat">
+      <a:schemeClr val="accent1">
+        <a:tint val="60000"/>
+      </a:schemeClr>
+    </dgm:linClrLst>
+    <dgm:effectClrLst/>
+    <dgm:txLinClrLst/>
+    <dgm:txFillClrLst/>
+    <dgm:txEffectClrLst/>
+  </dgm:styleLbl>
+  <dgm:styleLbl name="bgSibTrans2D1">
+    <dgm:fillClrLst meth="repeat">
+      <a:schemeClr val="accent1">
+        <a:tint val="60000"/>
+      </a:schemeClr>
+    </dgm:fillClrLst>
+    <dgm:linClrLst meth="repeat">
+      <a:schemeClr val="accent1">
+        <a:tint val="60000"/>
+      </a:schemeClr>
+    </dgm:linClrLst>
+    <dgm:effectClrLst/>
+    <dgm:txLinClrLst/>
+    <dgm:txFillClrLst/>
+    <dgm:txEffectClrLst/>
+  </dgm:styleLbl>
+  <dgm:styleLbl name="sibTrans1D1">
+    <dgm:fillClrLst meth="repeat">
+      <a:schemeClr val="accent1"/>
+    </dgm:fillClrLst>
+    <dgm:linClrLst meth="repeat">
+      <a:schemeClr val="accent1"/>
+    </dgm:linClrLst>
+    <dgm:effectClrLst/>
+    <dgm:txLinClrLst/>
+    <dgm:txFillClrLst meth="repeat">
+      <a:schemeClr val="tx1"/>
+    </dgm:txFillClrLst>
+    <dgm:txEffectClrLst/>
+  </dgm:styleLbl>
+  <dgm:styleLbl name="callout">
+    <dgm:fillClrLst meth="repeat">
+      <a:schemeClr val="accent1"/>
+    </dgm:fillClrLst>
+    <dgm:linClrLst meth="repeat">
+      <a:schemeClr val="accent1">
+        <a:tint val="50000"/>
+      </a:schemeClr>
+    </dgm:linClrLst>
+    <dgm:effectClrLst/>
+    <dgm:txLinClrLst/>
+    <dgm:txFillClrLst meth="repeat">
+      <a:schemeClr val="tx1"/>
+    </dgm:txFillClrLst>
+    <dgm:txEffectClrLst/>
+  </dgm:styleLbl>
+  <dgm:styleLbl name="asst0">
+    <dgm:fillClrLst meth="repeat">
+      <a:schemeClr val="accent1"/>
+    </dgm:fillClrLst>
+    <dgm:linClrLst meth="repeat">
+      <a:schemeClr val="lt1"/>
+    </dgm:linClrLst>
+    <dgm:effectClrLst/>
+    <dgm:txLinClrLst/>
+    <dgm:txFillClrLst/>
+    <dgm:txEffectClrLst/>
+  </dgm:styleLbl>
+  <dgm:styleLbl name="asst1">
+    <dgm:fillClrLst meth="repeat">
+      <a:schemeClr val="accent1"/>
+    </dgm:fillClrLst>
+    <dgm:linClrLst meth="repeat">
+      <a:schemeClr val="lt1"/>
+    </dgm:linClrLst>
+    <dgm:effectClrLst/>
+    <dgm:txLinClrLst/>
+    <dgm:txFillClrLst/>
+    <dgm:txEffectClrLst/>
+  </dgm:styleLbl>
+  <dgm:styleLbl name="asst2">
+    <dgm:fillClrLst meth="repeat">
+      <a:schemeClr val="accent1"/>
+    </dgm:fillClrLst>
+    <dgm:linClrLst meth="repeat">
+      <a:schemeClr val="lt1"/>
+    </dgm:linClrLst>
+    <dgm:effectClrLst/>
+    <dgm:txLinClrLst/>
+    <dgm:txFillClrLst/>
+    <dgm:txEffectClrLst/>
+  </dgm:styleLbl>
+  <dgm:styleLbl name="asst3">
+    <dgm:fillClrLst meth="repeat">
+      <a:schemeClr val="accent1"/>
+    </dgm:fillClrLst>
+    <dgm:linClrLst meth="repeat">
+      <a:schemeClr val="lt1"/>
+    </dgm:linClrLst>
+    <dgm:effectClrLst/>
+    <dgm:txLinClrLst/>
+    <dgm:txFillClrLst/>
+    <dgm:txEffectClrLst/>
+  </dgm:styleLbl>
+  <dgm:styleLbl name="asst4">
+    <dgm:fillClrLst meth="repeat">
+      <a:schemeClr val="accent1"/>
+    </dgm:fillClrLst>
+    <dgm:linClrLst meth="repeat">
+      <a:schemeClr val="lt1"/>
+    </dgm:linClrLst>
+    <dgm:effectClrLst/>
+    <dgm:txLinClrLst/>
+    <dgm:txFillClrLst/>
+    <dgm:txEffectClrLst/>
+  </dgm:styleLbl>
+  <dgm:styleLbl name="parChTrans2D1">
+    <dgm:fillClrLst meth="repeat">
+      <a:schemeClr val="accent1">
+        <a:tint val="60000"/>
+      </a:schemeClr>
+    </dgm:fillClrLst>
+    <dgm:linClrLst meth="repeat">
+      <a:schemeClr val="accent1">
+        <a:tint val="60000"/>
+      </a:schemeClr>
+    </dgm:linClrLst>
+    <dgm:effectClrLst/>
+    <dgm:txLinClrLst/>
+    <dgm:txFillClrLst meth="repeat">
+      <a:schemeClr val="lt1"/>
+    </dgm:txFillClrLst>
+    <dgm:txEffectClrLst/>
+  </dgm:styleLbl>
+  <dgm:styleLbl name="parChTrans2D2">
+    <dgm:fillClrLst meth="repeat">
+      <a:schemeClr val="accent1"/>
+    </dgm:fillClrLst>
+    <dgm:linClrLst meth="repeat">
+      <a:schemeClr val="accent1"/>
+    </dgm:linClrLst>
+    <dgm:effectClrLst/>
+    <dgm:txLinClrLst/>
+    <dgm:txFillClrLst meth="repeat">
+      <a:schemeClr val="lt1"/>
+    </dgm:txFillClrLst>
+    <dgm:txEffectClrLst/>
+  </dgm:styleLbl>
+  <dgm:styleLbl name="parChTrans2D3">
+    <dgm:fillClrLst meth="repeat">
+      <a:schemeClr val="accent1"/>
+    </dgm:fillClrLst>
+    <dgm:linClrLst meth="repeat">
+      <a:schemeClr val="accent1"/>
+    </dgm:linClrLst>
+    <dgm:effectClrLst/>
+    <dgm:txLinClrLst/>
+    <dgm:txFillClrLst meth="repeat">
+      <a:schemeClr val="lt1"/>
+    </dgm:txFillClrLst>
+    <dgm:txEffectClrLst/>
+  </dgm:styleLbl>
+  <dgm:styleLbl name="parChTrans2D4">
+    <dgm:fillClrLst meth="repeat">
+      <a:schemeClr val="accent1"/>
+    </dgm:fillClrLst>
+    <dgm:linClrLst meth="repeat">
+      <a:schemeClr val="accent1"/>
+    </dgm:linClrLst>
+    <dgm:effectClrLst/>
+    <dgm:txLinClrLst/>
+    <dgm:txFillClrLst meth="repeat">
+      <a:schemeClr val="lt1"/>
+    </dgm:txFillClrLst>
+    <dgm:txEffectClrLst/>
+  </dgm:styleLbl>
+  <dgm:styleLbl name="parChTrans1D1">
+    <dgm:fillClrLst meth="repeat">
+      <a:schemeClr val="accent1"/>
+    </dgm:fillClrLst>
+    <dgm:linClrLst meth="repeat">
+      <a:schemeClr val="accent1">
+        <a:shade val="60000"/>
+      </a:schemeClr>
+    </dgm:linClrLst>
+    <dgm:effectClrLst/>
+    <dgm:txLinClrLst/>
+    <dgm:txFillClrLst meth="repeat">
+      <a:schemeClr val="tx1"/>
+    </dgm:txFillClrLst>
+    <dgm:txEffectClrLst/>
+  </dgm:styleLbl>
+  <dgm:styleLbl name="parChTrans1D2">
+    <dgm:fillClrLst meth="repeat">
+      <a:schemeClr val="accent1"/>
+    </dgm:fillClrLst>
+    <dgm:linClrLst meth="repeat">
+      <a:schemeClr val="accent1">
+        <a:shade val="60000"/>
+      </a:schemeClr>
+    </dgm:linClrLst>
+    <dgm:effectClrLst/>
+    <dgm:txLinClrLst/>
+    <dgm:txFillClrLst meth="repeat">
+      <a:schemeClr val="tx1"/>
+    </dgm:txFillClrLst>
+    <dgm:txEffectClrLst/>
+  </dgm:styleLbl>
+  <dgm:styleLbl name="parChTrans1D3">
+    <dgm:fillClrLst meth="repeat">
+      <a:schemeClr val="accent1"/>
+    </dgm:fillClrLst>
+    <dgm:linClrLst meth="repeat">
+      <a:schemeClr val="accent1">
+        <a:shade val="80000"/>
+      </a:schemeClr>
+    </dgm:linClrLst>
+    <dgm:effectClrLst/>
+    <dgm:txLinClrLst/>
+    <dgm:txFillClrLst meth="repeat">
+      <a:schemeClr val="tx1"/>
+    </dgm:txFillClrLst>
+    <dgm:txEffectClrLst/>
+  </dgm:styleLbl>
+  <dgm:styleLbl name="parChTrans1D4">
+    <dgm:fillClrLst meth="repeat">
+      <a:schemeClr val="accent1"/>
+    </dgm:fillClrLst>
+    <dgm:linClrLst meth="repeat">
+      <a:schemeClr val="accent1">
+        <a:shade val="80000"/>
+      </a:schemeClr>
+    </dgm:linClrLst>
+    <dgm:effectClrLst/>
+    <dgm:txLinClrLst/>
+    <dgm:txFillClrLst meth="repeat">
+      <a:schemeClr val="tx1"/>
+    </dgm:txFillClrLst>
+    <dgm:txEffectClrLst/>
+  </dgm:styleLbl>
+  <dgm:styleLbl name="fgAcc1">
+    <dgm:fillClrLst meth="repeat">
+      <a:schemeClr val="lt1">
+        <a:alpha val="90000"/>
+      </a:schemeClr>
+    </dgm:fillClrLst>
+    <dgm:linClrLst meth="repeat">
+      <a:schemeClr val="accent1"/>
+    </dgm:linClrLst>
+    <dgm:effectClrLst/>
+    <dgm:txLinClrLst/>
+    <dgm:txFillClrLst meth="repeat">
+      <a:schemeClr val="dk1"/>
+    </dgm:txFillClrLst>
+    <dgm:txEffectClrLst/>
+  </dgm:styleLbl>
+  <dgm:styleLbl name="conFgAcc1">
+    <dgm:fillClrLst meth="repeat">
+      <a:schemeClr val="lt1">
+        <a:alpha val="90000"/>
+      </a:schemeClr>
+    </dgm:fillClrLst>
+    <dgm:linClrLst meth="repeat">
+      <a:schemeClr val="accent1"/>
+    </dgm:linClrLst>
+    <dgm:effectClrLst/>
+    <dgm:txLinClrLst/>
+    <dgm:txFillClrLst meth="repeat">
+      <a:schemeClr val="dk1"/>
+    </dgm:txFillClrLst>
+    <dgm:txEffectClrLst/>
+  </dgm:styleLbl>
+  <dgm:styleLbl name="alignAcc1">
+    <dgm:fillClrLst meth="repeat">
+      <a:schemeClr val="lt1">
+        <a:alpha val="90000"/>
+      </a:schemeClr>
+    </dgm:fillClrLst>
+    <dgm:linClrLst meth="repeat">
+      <a:schemeClr val="accent1"/>
+    </dgm:linClrLst>
+    <dgm:effectClrLst/>
+    <dgm:txLinClrLst/>
+    <dgm:txFillClrLst meth="repeat">
+      <a:schemeClr val="dk1"/>
+    </dgm:txFillClrLst>
+    <dgm:txEffectClrLst/>
+  </dgm:styleLbl>
+  <dgm:styleLbl name="trAlignAcc1">
+    <dgm:fillClrLst meth="repeat">
+      <a:schemeClr val="lt1">
+        <a:alpha val="40000"/>
+      </a:schemeClr>
+    </dgm:fillClrLst>
+    <dgm:linClrLst meth="repeat">
+      <a:schemeClr val="accent1"/>
+    </dgm:linClrLst>
+    <dgm:effectClrLst/>
+    <dgm:txLinClrLst/>
+    <dgm:txFillClrLst meth="repeat">
+      <a:schemeClr val="dk1"/>
+    </dgm:txFillClrLst>
+    <dgm:txEffectClrLst/>
+  </dgm:styleLbl>
+  <dgm:styleLbl name="bgAcc1">
+    <dgm:fillClrLst meth="repeat">
+      <a:schemeClr val="lt1">
+        <a:alpha val="90000"/>
+      </a:schemeClr>
+    </dgm:fillClrLst>
+    <dgm:linClrLst meth="repeat">
+      <a:schemeClr val="accent1"/>
+    </dgm:linClrLst>
+    <dgm:effectClrLst/>
+    <dgm:txLinClrLst/>
+    <dgm:txFillClrLst meth="repeat">
+      <a:schemeClr val="dk1"/>
+    </dgm:txFillClrLst>
+    <dgm:txEffectClrLst/>
+  </dgm:styleLbl>
+  <dgm:styleLbl name="solidFgAcc1">
+    <dgm:fillClrLst meth="repeat">
+      <a:schemeClr val="lt1"/>
+    </dgm:fillClrLst>
+    <dgm:linClrLst meth="repeat">
+      <a:schemeClr val="accent1"/>
+    </dgm:linClrLst>
+    <dgm:effectClrLst/>
+    <dgm:txLinClrLst/>
+    <dgm:txFillClrLst meth="repeat">
+      <a:schemeClr val="dk1"/>
+    </dgm:txFillClrLst>
+    <dgm:txEffectClrLst/>
+  </dgm:styleLbl>
+  <dgm:styleLbl name="solidAlignAcc1">
+    <dgm:fillClrLst meth="repeat">
+      <a:schemeClr val="lt1"/>
+    </dgm:fillClrLst>
+    <dgm:linClrLst meth="repeat">
+      <a:schemeClr val="accent1"/>
+    </dgm:linClrLst>
+    <dgm:effectClrLst/>
+    <dgm:txLinClrLst/>
+    <dgm:txFillClrLst meth="repeat">
+      <a:schemeClr val="dk1"/>
+    </dgm:txFillClrLst>
+    <dgm:txEffectClrLst/>
+  </dgm:styleLbl>
+  <dgm:styleLbl name="solidBgAcc1">
+    <dgm:fillClrLst meth="repeat">
+      <a:schemeClr val="lt1"/>
+    </dgm:fillClrLst>
+    <dgm:linClrLst meth="repeat">
+      <a:schemeClr val="accent1"/>
+    </dgm:linClrLst>
+    <dgm:effectClrLst/>
+    <dgm:txLinClrLst/>
+    <dgm:txFillClrLst meth="repeat">
+      <a:schemeClr val="dk1"/>
+    </dgm:txFillClrLst>
+    <dgm:txEffectClrLst/>
+  </dgm:styleLbl>
+  <dgm:styleLbl name="fgAccFollowNode1">
+    <dgm:fillClrLst meth="repeat">
+      <a:schemeClr val="accent1">
+        <a:alpha val="90000"/>
+        <a:tint val="40000"/>
+      </a:schemeClr>
+    </dgm:fillClrLst>
+    <dgm:linClrLst meth="repeat">
+      <a:schemeClr val="accent1">
+        <a:alpha val="90000"/>
+        <a:tint val="40000"/>
+      </a:schemeClr>
+    </dgm:linClrLst>
+    <dgm:effectClrLst/>
+    <dgm:txLinClrLst/>
+    <dgm:txFillClrLst meth="repeat">
+      <a:schemeClr val="dk1"/>
+    </dgm:txFillClrLst>
+    <dgm:txEffectClrLst/>
+  </dgm:styleLbl>
+  <dgm:styleLbl name="alignAccFollowNode1">
+    <dgm:fillClrLst meth="repeat">
+      <a:schemeClr val="accent1">
+        <a:alpha val="90000"/>
+        <a:tint val="40000"/>
+      </a:schemeClr>
+    </dgm:fillClrLst>
+    <dgm:linClrLst meth="repeat">
+      <a:schemeClr val="accent1">
+        <a:alpha val="90000"/>
+        <a:tint val="40000"/>
+      </a:schemeClr>
+    </dgm:linClrLst>
+    <dgm:effectClrLst/>
+    <dgm:txLinClrLst/>
+    <dgm:txFillClrLst meth="repeat">
+      <a:schemeClr val="dk1"/>
+    </dgm:txFillClrLst>
+    <dgm:txEffectClrLst/>
+  </dgm:styleLbl>
+  <dgm:styleLbl name="bgAccFollowNode1">
+    <dgm:fillClrLst meth="repeat">
+      <a:schemeClr val="accent1">
+        <a:alpha val="90000"/>
+        <a:tint val="40000"/>
+      </a:schemeClr>
+    </dgm:fillClrLst>
+    <dgm:linClrLst meth="repeat">
+      <a:schemeClr val="accent1">
+        <a:alpha val="90000"/>
+        <a:tint val="40000"/>
+      </a:schemeClr>
+    </dgm:linClrLst>
+    <dgm:effectClrLst/>
+    <dgm:txLinClrLst/>
+    <dgm:txFillClrLst meth="repeat">
+      <a:schemeClr val="dk1"/>
+    </dgm:txFillClrLst>
+    <dgm:txEffectClrLst/>
+  </dgm:styleLbl>
+  <dgm:styleLbl name="fgAcc0">
+    <dgm:fillClrLst meth="repeat">
+      <a:schemeClr val="lt1">
+        <a:alpha val="90000"/>
+      </a:schemeClr>
+    </dgm:fillClrLst>
+    <dgm:linClrLst meth="repeat">
+      <a:schemeClr val="accent1"/>
+    </dgm:linClrLst>
+    <dgm:effectClrLst/>
+    <dgm:txLinClrLst/>
+    <dgm:txFillClrLst meth="repeat">
+      <a:schemeClr val="dk1"/>
+    </dgm:txFillClrLst>
+    <dgm:txEffectClrLst/>
+  </dgm:styleLbl>
+  <dgm:styleLbl name="fgAcc2">
+    <dgm:fillClrLst meth="repeat">
+      <a:schemeClr val="lt1">
+        <a:alpha val="90000"/>
+      </a:schemeClr>
+    </dgm:fillClrLst>
+    <dgm:linClrLst meth="repeat">
+      <a:schemeClr val="accent1"/>
+    </dgm:linClrLst>
+    <dgm:effectClrLst/>
+    <dgm:txLinClrLst/>
+    <dgm:txFillClrLst meth="repeat">
+      <a:schemeClr val="dk1"/>
+    </dgm:txFillClrLst>
+    <dgm:txEffectClrLst/>
+  </dgm:styleLbl>
+  <dgm:styleLbl name="fgAcc3">
+    <dgm:fillClrLst meth="repeat">
+      <a:schemeClr val="lt1">
+        <a:alpha val="90000"/>
+      </a:schemeClr>
+    </dgm:fillClrLst>
+    <dgm:linClrLst meth="repeat">
+      <a:schemeClr val="accent1"/>
+    </dgm:linClrLst>
+    <dgm:effectClrLst/>
+    <dgm:txLinClrLst/>
+    <dgm:txFillClrLst meth="repeat">
+      <a:schemeClr val="dk1"/>
+    </dgm:txFillClrLst>
+    <dgm:txEffectClrLst/>
+  </dgm:styleLbl>
+  <dgm:styleLbl name="fgAcc4">
+    <dgm:fillClrLst meth="repeat">
+      <a:schemeClr val="lt1">
+        <a:alpha val="90000"/>
+      </a:schemeClr>
+    </dgm:fillClrLst>
+    <dgm:linClrLst meth="repeat">
+      <a:schemeClr val="accent1"/>
+    </dgm:linClrLst>
+    <dgm:effectClrLst/>
+    <dgm:txLinClrLst/>
+    <dgm:txFillClrLst meth="repeat">
+      <a:schemeClr val="dk1"/>
+    </dgm:txFillClrLst>
+    <dgm:txEffectClrLst/>
+  </dgm:styleLbl>
+  <dgm:styleLbl name="bgShp">
+    <dgm:fillClrLst meth="repeat">
+      <a:schemeClr val="accent1">
+        <a:tint val="40000"/>
+      </a:schemeClr>
+    </dgm:fillClrLst>
+    <dgm:linClrLst meth="repeat">
+      <a:schemeClr val="accent1"/>
+    </dgm:linClrLst>
+    <dgm:effectClrLst/>
+    <dgm:txLinClrLst/>
+    <dgm:txFillClrLst meth="repeat">
+      <a:schemeClr val="dk1"/>
+    </dgm:txFillClrLst>
+    <dgm:txEffectClrLst/>
+  </dgm:styleLbl>
+  <dgm:styleLbl name="dkBgShp">
+    <dgm:fillClrLst meth="repeat">
+      <a:schemeClr val="accent1">
+        <a:shade val="80000"/>
+      </a:schemeClr>
+    </dgm:fillClrLst>
+    <dgm:linClrLst meth="repeat">
+      <a:schemeClr val="accent1"/>
+    </dgm:linClrLst>
+    <dgm:effectClrLst/>
+    <dgm:txLinClrLst/>
+    <dgm:txFillClrLst meth="repeat">
+      <a:schemeClr val="lt1"/>
+    </dgm:txFillClrLst>
+    <dgm:txEffectClrLst/>
+  </dgm:styleLbl>
+  <dgm:styleLbl name="trBgShp">
+    <dgm:fillClrLst meth="repeat">
+      <a:schemeClr val="accent1">
+        <a:tint val="50000"/>
+        <a:alpha val="40000"/>
+      </a:schemeClr>
+    </dgm:fillClrLst>
+    <dgm:linClrLst meth="repeat">
+      <a:schemeClr val="accent1"/>
+    </dgm:linClrLst>
+    <dgm:effectClrLst/>
+    <dgm:txLinClrLst/>
+    <dgm:txFillClrLst meth="repeat">
+      <a:schemeClr val="lt1"/>
+    </dgm:txFillClrLst>
+    <dgm:txEffectClrLst/>
+  </dgm:styleLbl>
+  <dgm:styleLbl name="fgShp">
+    <dgm:fillClrLst meth="repeat">
+      <a:schemeClr val="accent1">
+        <a:tint val="60000"/>
+      </a:schemeClr>
+    </dgm:fillClrLst>
+    <dgm:linClrLst meth="repeat">
+      <a:schemeClr val="lt1"/>
+    </dgm:linClrLst>
+    <dgm:effectClrLst/>
+    <dgm:txLinClrLst/>
+    <dgm:txFillClrLst meth="repeat">
+      <a:schemeClr val="dk1"/>
+    </dgm:txFillClrLst>
+    <dgm:txEffectClrLst/>
+  </dgm:styleLbl>
+  <dgm:styleLbl name="revTx">
+    <dgm:fillClrLst meth="repeat">
+      <a:schemeClr val="lt1">
+        <a:alpha val="0"/>
+      </a:schemeClr>
+    </dgm:fillClrLst>
+    <dgm:linClrLst meth="repeat">
+      <a:schemeClr val="dk1">
+        <a:alpha val="0"/>
+      </a:schemeClr>
+    </dgm:linClrLst>
+    <dgm:effectClrLst/>
+    <dgm:txLinClrLst/>
+    <dgm:txFillClrLst meth="repeat">
+      <a:schemeClr val="tx1"/>
+    </dgm:txFillClrLst>
+    <dgm:txEffectClrLst/>
+  </dgm:styleLbl>
+</dgm:colorsDef>
+</file>
+
 <file path=ppt/diagrams/data1.xml><?xml version="1.0" encoding="utf-8"?>
+<dgm:dataModel xmlns:dgm="http://schemas.openxmlformats.org/drawingml/2006/diagram" xmlns:a="http://schemas.openxmlformats.org/drawingml/2006/main">
+  <dgm:ptLst>
+    <dgm:pt modelId="{0B109F4A-61A5-4281-9FE6-E216BE54B774}" type="doc">
+      <dgm:prSet loTypeId="urn:microsoft.com/office/officeart/2005/8/layout/default" loCatId="list" qsTypeId="urn:microsoft.com/office/officeart/2005/8/quickstyle/simple1" qsCatId="simple" csTypeId="urn:microsoft.com/office/officeart/2005/8/colors/accent1_2" csCatId="accent1"/>
+      <dgm:spPr/>
+      <dgm:t>
+        <a:bodyPr/>
+        <a:lstStyle/>
+        <a:p>
+          <a:endParaRPr lang="en-US"/>
+        </a:p>
+      </dgm:t>
+    </dgm:pt>
+    <dgm:pt modelId="{A98AA223-5296-4DA8-B918-A260D2155DD0}">
+      <dgm:prSet/>
+      <dgm:spPr/>
+      <dgm:t>
+        <a:bodyPr/>
+        <a:lstStyle/>
+        <a:p>
+          <a:r>
+            <a:rPr lang="en-US"/>
+            <a:t>Improves the quality of the response</a:t>
+          </a:r>
+        </a:p>
+      </dgm:t>
+    </dgm:pt>
+    <dgm:pt modelId="{E5304615-6CBF-48DE-B936-AE52D03ECB57}" type="parTrans" cxnId="{718AD002-5072-4D47-95E0-224A0A65A06F}">
+      <dgm:prSet/>
+      <dgm:spPr/>
+      <dgm:t>
+        <a:bodyPr/>
+        <a:lstStyle/>
+        <a:p>
+          <a:endParaRPr lang="en-US"/>
+        </a:p>
+      </dgm:t>
+    </dgm:pt>
+    <dgm:pt modelId="{4AAE4A56-9E1C-4E2D-8094-2A17A6055EAB}" type="sibTrans" cxnId="{718AD002-5072-4D47-95E0-224A0A65A06F}">
+      <dgm:prSet/>
+      <dgm:spPr/>
+      <dgm:t>
+        <a:bodyPr/>
+        <a:lstStyle/>
+        <a:p>
+          <a:endParaRPr lang="en-US"/>
+        </a:p>
+      </dgm:t>
+    </dgm:pt>
+    <dgm:pt modelId="{63B340EC-2745-40B8-BBFE-20DC34F6FA0E}">
+      <dgm:prSet/>
+      <dgm:spPr/>
+      <dgm:t>
+        <a:bodyPr/>
+        <a:lstStyle/>
+        <a:p>
+          <a:r>
+            <a:rPr lang="en-US"/>
+            <a:t>Adds information that the LLM doesn’t know about</a:t>
+          </a:r>
+        </a:p>
+      </dgm:t>
+    </dgm:pt>
+    <dgm:pt modelId="{E59F9FBF-8008-4A90-B17F-80646A004471}" type="parTrans" cxnId="{F4927ABB-E0D3-478A-8D57-DD4A5D26C3C5}">
+      <dgm:prSet/>
+      <dgm:spPr/>
+      <dgm:t>
+        <a:bodyPr/>
+        <a:lstStyle/>
+        <a:p>
+          <a:endParaRPr lang="en-US"/>
+        </a:p>
+      </dgm:t>
+    </dgm:pt>
+    <dgm:pt modelId="{EFA47FA0-921B-4E6A-B479-61092CEC4E2B}" type="sibTrans" cxnId="{F4927ABB-E0D3-478A-8D57-DD4A5D26C3C5}">
+      <dgm:prSet/>
+      <dgm:spPr/>
+      <dgm:t>
+        <a:bodyPr/>
+        <a:lstStyle/>
+        <a:p>
+          <a:endParaRPr lang="en-US"/>
+        </a:p>
+      </dgm:t>
+    </dgm:pt>
+    <dgm:pt modelId="{9E3EA29C-B6EF-4DCC-88CB-072DA8DCB4B9}">
+      <dgm:prSet/>
+      <dgm:spPr/>
+      <dgm:t>
+        <a:bodyPr/>
+        <a:lstStyle/>
+        <a:p>
+          <a:r>
+            <a:rPr lang="en-US"/>
+            <a:t>Lets you use your own intellectual property (IP) safely</a:t>
+          </a:r>
+        </a:p>
+      </dgm:t>
+    </dgm:pt>
+    <dgm:pt modelId="{AD528891-272E-47AA-936C-8A245A4A7685}" type="parTrans" cxnId="{ED349B56-57BD-4BD3-8A82-885F97F7E01D}">
+      <dgm:prSet/>
+      <dgm:spPr/>
+      <dgm:t>
+        <a:bodyPr/>
+        <a:lstStyle/>
+        <a:p>
+          <a:endParaRPr lang="en-US"/>
+        </a:p>
+      </dgm:t>
+    </dgm:pt>
+    <dgm:pt modelId="{9ADED277-F638-478B-9CF8-9FBEF67396D7}" type="sibTrans" cxnId="{ED349B56-57BD-4BD3-8A82-885F97F7E01D}">
+      <dgm:prSet/>
+      <dgm:spPr/>
+      <dgm:t>
+        <a:bodyPr/>
+        <a:lstStyle/>
+        <a:p>
+          <a:endParaRPr lang="en-US"/>
+        </a:p>
+      </dgm:t>
+    </dgm:pt>
+    <dgm:pt modelId="{474E3FAD-323C-4585-8CCC-5836946BD552}">
+      <dgm:prSet/>
+      <dgm:spPr/>
+      <dgm:t>
+        <a:bodyPr/>
+        <a:lstStyle/>
+        <a:p>
+          <a:r>
+            <a:rPr lang="en-US"/>
+            <a:t>Don’t need the expense, resources, and time to train a new LLM</a:t>
+          </a:r>
+        </a:p>
+      </dgm:t>
+    </dgm:pt>
+    <dgm:pt modelId="{9A7DE8AE-8AAA-49BE-BCDF-158FBD42F52E}" type="parTrans" cxnId="{48DB7EC1-61A1-46F4-9B69-4F26968ABBB5}">
+      <dgm:prSet/>
+      <dgm:spPr/>
+      <dgm:t>
+        <a:bodyPr/>
+        <a:lstStyle/>
+        <a:p>
+          <a:endParaRPr lang="en-US"/>
+        </a:p>
+      </dgm:t>
+    </dgm:pt>
+    <dgm:pt modelId="{06AA58A0-C4FD-4549-B809-9A2E7A165CC8}" type="sibTrans" cxnId="{48DB7EC1-61A1-46F4-9B69-4F26968ABBB5}">
+      <dgm:prSet/>
+      <dgm:spPr/>
+      <dgm:t>
+        <a:bodyPr/>
+        <a:lstStyle/>
+        <a:p>
+          <a:endParaRPr lang="en-US"/>
+        </a:p>
+      </dgm:t>
+    </dgm:pt>
+    <dgm:pt modelId="{F1955EF6-CD2A-4829-A66D-F2F6EDF4C6CE}">
+      <dgm:prSet/>
+      <dgm:spPr/>
+      <dgm:t>
+        <a:bodyPr/>
+        <a:lstStyle/>
+        <a:p>
+          <a:r>
+            <a:rPr lang="en-US"/>
+            <a:t>Can use current data that doesn’t get stale</a:t>
+          </a:r>
+        </a:p>
+      </dgm:t>
+    </dgm:pt>
+    <dgm:pt modelId="{BE0F4D34-989E-40AB-8DDC-79DBA0B1D53F}" type="parTrans" cxnId="{9DFF5FE2-6863-4CBC-81C0-98B8FC4A005C}">
+      <dgm:prSet/>
+      <dgm:spPr/>
+      <dgm:t>
+        <a:bodyPr/>
+        <a:lstStyle/>
+        <a:p>
+          <a:endParaRPr lang="en-US"/>
+        </a:p>
+      </dgm:t>
+    </dgm:pt>
+    <dgm:pt modelId="{459F8F07-5235-48C7-B9FF-5214B5A1B9AF}" type="sibTrans" cxnId="{9DFF5FE2-6863-4CBC-81C0-98B8FC4A005C}">
+      <dgm:prSet/>
+      <dgm:spPr/>
+      <dgm:t>
+        <a:bodyPr/>
+        <a:lstStyle/>
+        <a:p>
+          <a:endParaRPr lang="en-US"/>
+        </a:p>
+      </dgm:t>
+    </dgm:pt>
+    <dgm:pt modelId="{80214533-F9C7-4D22-B215-42AFD9DC3CFA}" type="pres">
+      <dgm:prSet presAssocID="{0B109F4A-61A5-4281-9FE6-E216BE54B774}" presName="diagram" presStyleCnt="0">
+        <dgm:presLayoutVars>
+          <dgm:dir/>
+          <dgm:resizeHandles val="exact"/>
+        </dgm:presLayoutVars>
+      </dgm:prSet>
+      <dgm:spPr/>
+    </dgm:pt>
+    <dgm:pt modelId="{DD7B3447-4261-4905-A6CE-120B5F20215A}" type="pres">
+      <dgm:prSet presAssocID="{A98AA223-5296-4DA8-B918-A260D2155DD0}" presName="node" presStyleLbl="node1" presStyleIdx="0" presStyleCnt="5">
+        <dgm:presLayoutVars>
+          <dgm:bulletEnabled val="1"/>
+        </dgm:presLayoutVars>
+      </dgm:prSet>
+      <dgm:spPr/>
+    </dgm:pt>
+    <dgm:pt modelId="{3AA405A0-57D0-40B2-B3D9-E5E92514BD04}" type="pres">
+      <dgm:prSet presAssocID="{4AAE4A56-9E1C-4E2D-8094-2A17A6055EAB}" presName="sibTrans" presStyleCnt="0"/>
+      <dgm:spPr/>
+    </dgm:pt>
+    <dgm:pt modelId="{6EE7DEDA-E4F9-4411-80D3-695A75B2D2C5}" type="pres">
+      <dgm:prSet presAssocID="{63B340EC-2745-40B8-BBFE-20DC34F6FA0E}" presName="node" presStyleLbl="node1" presStyleIdx="1" presStyleCnt="5">
+        <dgm:presLayoutVars>
+          <dgm:bulletEnabled val="1"/>
+        </dgm:presLayoutVars>
+      </dgm:prSet>
+      <dgm:spPr/>
+    </dgm:pt>
+    <dgm:pt modelId="{FD059D6A-7769-41D7-BD2E-358D00FBA21B}" type="pres">
+      <dgm:prSet presAssocID="{EFA47FA0-921B-4E6A-B479-61092CEC4E2B}" presName="sibTrans" presStyleCnt="0"/>
+      <dgm:spPr/>
+    </dgm:pt>
+    <dgm:pt modelId="{D74E0E39-90F4-4963-91B7-3B4E847E050D}" type="pres">
+      <dgm:prSet presAssocID="{9E3EA29C-B6EF-4DCC-88CB-072DA8DCB4B9}" presName="node" presStyleLbl="node1" presStyleIdx="2" presStyleCnt="5">
+        <dgm:presLayoutVars>
+          <dgm:bulletEnabled val="1"/>
+        </dgm:presLayoutVars>
+      </dgm:prSet>
+      <dgm:spPr/>
+    </dgm:pt>
+    <dgm:pt modelId="{C05457EA-4B1E-4AD3-8B22-6B611BE693CA}" type="pres">
+      <dgm:prSet presAssocID="{9ADED277-F638-478B-9CF8-9FBEF67396D7}" presName="sibTrans" presStyleCnt="0"/>
+      <dgm:spPr/>
+    </dgm:pt>
+    <dgm:pt modelId="{82C8B3B3-B26D-4785-91EA-7CAB05FF6DC0}" type="pres">
+      <dgm:prSet presAssocID="{474E3FAD-323C-4585-8CCC-5836946BD552}" presName="node" presStyleLbl="node1" presStyleIdx="3" presStyleCnt="5">
+        <dgm:presLayoutVars>
+          <dgm:bulletEnabled val="1"/>
+        </dgm:presLayoutVars>
+      </dgm:prSet>
+      <dgm:spPr/>
+    </dgm:pt>
+    <dgm:pt modelId="{25BD5CEA-B33D-4FCF-BC6C-9059ACABF703}" type="pres">
+      <dgm:prSet presAssocID="{06AA58A0-C4FD-4549-B809-9A2E7A165CC8}" presName="sibTrans" presStyleCnt="0"/>
+      <dgm:spPr/>
+    </dgm:pt>
+    <dgm:pt modelId="{C7568179-198C-472C-949D-65D740F6E01B}" type="pres">
+      <dgm:prSet presAssocID="{F1955EF6-CD2A-4829-A66D-F2F6EDF4C6CE}" presName="node" presStyleLbl="node1" presStyleIdx="4" presStyleCnt="5">
+        <dgm:presLayoutVars>
+          <dgm:bulletEnabled val="1"/>
+        </dgm:presLayoutVars>
+      </dgm:prSet>
+      <dgm:spPr/>
+    </dgm:pt>
+  </dgm:ptLst>
+  <dgm:cxnLst>
+    <dgm:cxn modelId="{718AD002-5072-4D47-95E0-224A0A65A06F}" srcId="{0B109F4A-61A5-4281-9FE6-E216BE54B774}" destId="{A98AA223-5296-4DA8-B918-A260D2155DD0}" srcOrd="0" destOrd="0" parTransId="{E5304615-6CBF-48DE-B936-AE52D03ECB57}" sibTransId="{4AAE4A56-9E1C-4E2D-8094-2A17A6055EAB}"/>
+    <dgm:cxn modelId="{604DED28-0BE2-4677-BFF6-CA5EBF77B7E9}" type="presOf" srcId="{A98AA223-5296-4DA8-B918-A260D2155DD0}" destId="{DD7B3447-4261-4905-A6CE-120B5F20215A}" srcOrd="0" destOrd="0" presId="urn:microsoft.com/office/officeart/2005/8/layout/default"/>
+    <dgm:cxn modelId="{F5674335-33B1-413E-AD14-11217BE64B51}" type="presOf" srcId="{9E3EA29C-B6EF-4DCC-88CB-072DA8DCB4B9}" destId="{D74E0E39-90F4-4963-91B7-3B4E847E050D}" srcOrd="0" destOrd="0" presId="urn:microsoft.com/office/officeart/2005/8/layout/default"/>
+    <dgm:cxn modelId="{ED349B56-57BD-4BD3-8A82-885F97F7E01D}" srcId="{0B109F4A-61A5-4281-9FE6-E216BE54B774}" destId="{9E3EA29C-B6EF-4DCC-88CB-072DA8DCB4B9}" srcOrd="2" destOrd="0" parTransId="{AD528891-272E-47AA-936C-8A245A4A7685}" sibTransId="{9ADED277-F638-478B-9CF8-9FBEF67396D7}"/>
+    <dgm:cxn modelId="{CCD0748F-DA47-4409-A95A-D89EBB8D9A7F}" type="presOf" srcId="{F1955EF6-CD2A-4829-A66D-F2F6EDF4C6CE}" destId="{C7568179-198C-472C-949D-65D740F6E01B}" srcOrd="0" destOrd="0" presId="urn:microsoft.com/office/officeart/2005/8/layout/default"/>
+    <dgm:cxn modelId="{2B59F39D-9218-4F38-92C3-A06A0109746B}" type="presOf" srcId="{474E3FAD-323C-4585-8CCC-5836946BD552}" destId="{82C8B3B3-B26D-4785-91EA-7CAB05FF6DC0}" srcOrd="0" destOrd="0" presId="urn:microsoft.com/office/officeart/2005/8/layout/default"/>
+    <dgm:cxn modelId="{F4927ABB-E0D3-478A-8D57-DD4A5D26C3C5}" srcId="{0B109F4A-61A5-4281-9FE6-E216BE54B774}" destId="{63B340EC-2745-40B8-BBFE-20DC34F6FA0E}" srcOrd="1" destOrd="0" parTransId="{E59F9FBF-8008-4A90-B17F-80646A004471}" sibTransId="{EFA47FA0-921B-4E6A-B479-61092CEC4E2B}"/>
+    <dgm:cxn modelId="{48DB7EC1-61A1-46F4-9B69-4F26968ABBB5}" srcId="{0B109F4A-61A5-4281-9FE6-E216BE54B774}" destId="{474E3FAD-323C-4585-8CCC-5836946BD552}" srcOrd="3" destOrd="0" parTransId="{9A7DE8AE-8AAA-49BE-BCDF-158FBD42F52E}" sibTransId="{06AA58A0-C4FD-4549-B809-9A2E7A165CC8}"/>
+    <dgm:cxn modelId="{53D694C3-E7B1-4408-AC99-D6030574131B}" type="presOf" srcId="{63B340EC-2745-40B8-BBFE-20DC34F6FA0E}" destId="{6EE7DEDA-E4F9-4411-80D3-695A75B2D2C5}" srcOrd="0" destOrd="0" presId="urn:microsoft.com/office/officeart/2005/8/layout/default"/>
+    <dgm:cxn modelId="{9DFF5FE2-6863-4CBC-81C0-98B8FC4A005C}" srcId="{0B109F4A-61A5-4281-9FE6-E216BE54B774}" destId="{F1955EF6-CD2A-4829-A66D-F2F6EDF4C6CE}" srcOrd="4" destOrd="0" parTransId="{BE0F4D34-989E-40AB-8DDC-79DBA0B1D53F}" sibTransId="{459F8F07-5235-48C7-B9FF-5214B5A1B9AF}"/>
+    <dgm:cxn modelId="{73236DF1-C07F-4FD7-8627-472F9ED8A42B}" type="presOf" srcId="{0B109F4A-61A5-4281-9FE6-E216BE54B774}" destId="{80214533-F9C7-4D22-B215-42AFD9DC3CFA}" srcOrd="0" destOrd="0" presId="urn:microsoft.com/office/officeart/2005/8/layout/default"/>
+    <dgm:cxn modelId="{005044E5-C125-4E97-AD76-F26BCFD7F04E}" type="presParOf" srcId="{80214533-F9C7-4D22-B215-42AFD9DC3CFA}" destId="{DD7B3447-4261-4905-A6CE-120B5F20215A}" srcOrd="0" destOrd="0" presId="urn:microsoft.com/office/officeart/2005/8/layout/default"/>
+    <dgm:cxn modelId="{D0A7BC90-7177-4062-944D-A767B3D71376}" type="presParOf" srcId="{80214533-F9C7-4D22-B215-42AFD9DC3CFA}" destId="{3AA405A0-57D0-40B2-B3D9-E5E92514BD04}" srcOrd="1" destOrd="0" presId="urn:microsoft.com/office/officeart/2005/8/layout/default"/>
+    <dgm:cxn modelId="{00A70B6C-0416-467E-BE56-8B2EA7731F66}" type="presParOf" srcId="{80214533-F9C7-4D22-B215-42AFD9DC3CFA}" destId="{6EE7DEDA-E4F9-4411-80D3-695A75B2D2C5}" srcOrd="2" destOrd="0" presId="urn:microsoft.com/office/officeart/2005/8/layout/default"/>
+    <dgm:cxn modelId="{AFA5ABB1-DE78-4FD0-AC02-19A5556DA5FD}" type="presParOf" srcId="{80214533-F9C7-4D22-B215-42AFD9DC3CFA}" destId="{FD059D6A-7769-41D7-BD2E-358D00FBA21B}" srcOrd="3" destOrd="0" presId="urn:microsoft.com/office/officeart/2005/8/layout/default"/>
+    <dgm:cxn modelId="{A5C0ECD5-AFA2-4018-8C2D-1C0F35E433CB}" type="presParOf" srcId="{80214533-F9C7-4D22-B215-42AFD9DC3CFA}" destId="{D74E0E39-90F4-4963-91B7-3B4E847E050D}" srcOrd="4" destOrd="0" presId="urn:microsoft.com/office/officeart/2005/8/layout/default"/>
+    <dgm:cxn modelId="{F2BE88CC-0C20-480B-96CE-C417AF74D87D}" type="presParOf" srcId="{80214533-F9C7-4D22-B215-42AFD9DC3CFA}" destId="{C05457EA-4B1E-4AD3-8B22-6B611BE693CA}" srcOrd="5" destOrd="0" presId="urn:microsoft.com/office/officeart/2005/8/layout/default"/>
+    <dgm:cxn modelId="{45A13085-1D6A-4BA5-A3A8-5CB951A1ADD4}" type="presParOf" srcId="{80214533-F9C7-4D22-B215-42AFD9DC3CFA}" destId="{82C8B3B3-B26D-4785-91EA-7CAB05FF6DC0}" srcOrd="6" destOrd="0" presId="urn:microsoft.com/office/officeart/2005/8/layout/default"/>
+    <dgm:cxn modelId="{A0B191E1-50B6-4A86-ACC2-C22AA9CD3D0A}" type="presParOf" srcId="{80214533-F9C7-4D22-B215-42AFD9DC3CFA}" destId="{25BD5CEA-B33D-4FCF-BC6C-9059ACABF703}" srcOrd="7" destOrd="0" presId="urn:microsoft.com/office/officeart/2005/8/layout/default"/>
+    <dgm:cxn modelId="{E11D864E-DD51-4CF4-9BD3-7749393B55D7}" type="presParOf" srcId="{80214533-F9C7-4D22-B215-42AFD9DC3CFA}" destId="{C7568179-198C-472C-949D-65D740F6E01B}" srcOrd="8" destOrd="0" presId="urn:microsoft.com/office/officeart/2005/8/layout/default"/>
+  </dgm:cxnLst>
+  <dgm:bg/>
+  <dgm:whole/>
+  <dgm:extLst>
+    <a:ext uri="http://schemas.microsoft.com/office/drawing/2008/diagram">
+      <dsp:dataModelExt xmlns:dsp="http://schemas.microsoft.com/office/drawing/2008/diagram" relId="rId6" minVer="http://schemas.openxmlformats.org/drawingml/2006/diagram"/>
+    </a:ext>
+  </dgm:extLst>
+</dgm:dataModel>
+</file>
+
+<file path=ppt/diagrams/data2.xml><?xml version="1.0" encoding="utf-8"?>
 <dgm:dataModel xmlns:dgm="http://schemas.openxmlformats.org/drawingml/2006/diagram" xmlns:a="http://schemas.openxmlformats.org/drawingml/2006/main">
   <dgm:ptLst>
     <dgm:pt modelId="{0AB57387-677A-47E1-836A-0FBAD2B5BA43}" type="doc">
@@ -1376,6 +2415,408 @@
 </file>
 
 <file path=ppt/diagrams/drawing1.xml><?xml version="1.0" encoding="utf-8"?>
+<dsp:drawing xmlns:dgm="http://schemas.openxmlformats.org/drawingml/2006/diagram" xmlns:dsp="http://schemas.microsoft.com/office/drawing/2008/diagram" xmlns:a="http://schemas.openxmlformats.org/drawingml/2006/main">
+  <dsp:spTree>
+    <dsp:nvGrpSpPr>
+      <dsp:cNvPr id="0" name=""/>
+      <dsp:cNvGrpSpPr/>
+    </dsp:nvGrpSpPr>
+    <dsp:grpSpPr/>
+    <dsp:sp modelId="{DD7B3447-4261-4905-A6CE-120B5F20215A}">
+      <dsp:nvSpPr>
+        <dsp:cNvPr id="0" name=""/>
+        <dsp:cNvSpPr/>
+      </dsp:nvSpPr>
+      <dsp:spPr>
+        <a:xfrm>
+          <a:off x="0" y="39687"/>
+          <a:ext cx="3286125" cy="1971675"/>
+        </a:xfrm>
+        <a:prstGeom prst="rect">
+          <a:avLst/>
+        </a:prstGeom>
+        <a:solidFill>
+          <a:schemeClr val="accent1">
+            <a:hueOff val="0"/>
+            <a:satOff val="0"/>
+            <a:lumOff val="0"/>
+            <a:alphaOff val="0"/>
+          </a:schemeClr>
+        </a:solidFill>
+        <a:ln w="12700" cap="flat" cmpd="sng" algn="ctr">
+          <a:solidFill>
+            <a:schemeClr val="lt1">
+              <a:hueOff val="0"/>
+              <a:satOff val="0"/>
+              <a:lumOff val="0"/>
+              <a:alphaOff val="0"/>
+            </a:schemeClr>
+          </a:solidFill>
+          <a:prstDash val="solid"/>
+          <a:miter lim="800000"/>
+        </a:ln>
+        <a:effectLst/>
+      </dsp:spPr>
+      <dsp:style>
+        <a:lnRef idx="2">
+          <a:scrgbClr r="0" g="0" b="0"/>
+        </a:lnRef>
+        <a:fillRef idx="1">
+          <a:scrgbClr r="0" g="0" b="0"/>
+        </a:fillRef>
+        <a:effectRef idx="0">
+          <a:scrgbClr r="0" g="0" b="0"/>
+        </a:effectRef>
+        <a:fontRef idx="minor">
+          <a:schemeClr val="lt1"/>
+        </a:fontRef>
+      </dsp:style>
+      <dsp:txBody>
+        <a:bodyPr spcFirstLastPara="0" vert="horz" wrap="square" lIns="114300" tIns="114300" rIns="114300" bIns="114300" numCol="1" spcCol="1270" anchor="ctr" anchorCtr="0">
+          <a:noAutofit/>
+        </a:bodyPr>
+        <a:lstStyle/>
+        <a:p>
+          <a:pPr marL="0" lvl="0" indent="0" algn="ctr" defTabSz="1333500">
+            <a:lnSpc>
+              <a:spcPct val="90000"/>
+            </a:lnSpc>
+            <a:spcBef>
+              <a:spcPct val="0"/>
+            </a:spcBef>
+            <a:spcAft>
+              <a:spcPct val="35000"/>
+            </a:spcAft>
+            <a:buNone/>
+          </a:pPr>
+          <a:r>
+            <a:rPr lang="en-US" sz="3000" kern="1200"/>
+            <a:t>Improves the quality of the response</a:t>
+          </a:r>
+        </a:p>
+      </dsp:txBody>
+      <dsp:txXfrm>
+        <a:off x="0" y="39687"/>
+        <a:ext cx="3286125" cy="1971675"/>
+      </dsp:txXfrm>
+    </dsp:sp>
+    <dsp:sp modelId="{6EE7DEDA-E4F9-4411-80D3-695A75B2D2C5}">
+      <dsp:nvSpPr>
+        <dsp:cNvPr id="0" name=""/>
+        <dsp:cNvSpPr/>
+      </dsp:nvSpPr>
+      <dsp:spPr>
+        <a:xfrm>
+          <a:off x="3614737" y="39687"/>
+          <a:ext cx="3286125" cy="1971675"/>
+        </a:xfrm>
+        <a:prstGeom prst="rect">
+          <a:avLst/>
+        </a:prstGeom>
+        <a:solidFill>
+          <a:schemeClr val="accent1">
+            <a:hueOff val="0"/>
+            <a:satOff val="0"/>
+            <a:lumOff val="0"/>
+            <a:alphaOff val="0"/>
+          </a:schemeClr>
+        </a:solidFill>
+        <a:ln w="12700" cap="flat" cmpd="sng" algn="ctr">
+          <a:solidFill>
+            <a:schemeClr val="lt1">
+              <a:hueOff val="0"/>
+              <a:satOff val="0"/>
+              <a:lumOff val="0"/>
+              <a:alphaOff val="0"/>
+            </a:schemeClr>
+          </a:solidFill>
+          <a:prstDash val="solid"/>
+          <a:miter lim="800000"/>
+        </a:ln>
+        <a:effectLst/>
+      </dsp:spPr>
+      <dsp:style>
+        <a:lnRef idx="2">
+          <a:scrgbClr r="0" g="0" b="0"/>
+        </a:lnRef>
+        <a:fillRef idx="1">
+          <a:scrgbClr r="0" g="0" b="0"/>
+        </a:fillRef>
+        <a:effectRef idx="0">
+          <a:scrgbClr r="0" g="0" b="0"/>
+        </a:effectRef>
+        <a:fontRef idx="minor">
+          <a:schemeClr val="lt1"/>
+        </a:fontRef>
+      </dsp:style>
+      <dsp:txBody>
+        <a:bodyPr spcFirstLastPara="0" vert="horz" wrap="square" lIns="114300" tIns="114300" rIns="114300" bIns="114300" numCol="1" spcCol="1270" anchor="ctr" anchorCtr="0">
+          <a:noAutofit/>
+        </a:bodyPr>
+        <a:lstStyle/>
+        <a:p>
+          <a:pPr marL="0" lvl="0" indent="0" algn="ctr" defTabSz="1333500">
+            <a:lnSpc>
+              <a:spcPct val="90000"/>
+            </a:lnSpc>
+            <a:spcBef>
+              <a:spcPct val="0"/>
+            </a:spcBef>
+            <a:spcAft>
+              <a:spcPct val="35000"/>
+            </a:spcAft>
+            <a:buNone/>
+          </a:pPr>
+          <a:r>
+            <a:rPr lang="en-US" sz="3000" kern="1200"/>
+            <a:t>Adds information that the LLM doesn’t know about</a:t>
+          </a:r>
+        </a:p>
+      </dsp:txBody>
+      <dsp:txXfrm>
+        <a:off x="3614737" y="39687"/>
+        <a:ext cx="3286125" cy="1971675"/>
+      </dsp:txXfrm>
+    </dsp:sp>
+    <dsp:sp modelId="{D74E0E39-90F4-4963-91B7-3B4E847E050D}">
+      <dsp:nvSpPr>
+        <dsp:cNvPr id="0" name=""/>
+        <dsp:cNvSpPr/>
+      </dsp:nvSpPr>
+      <dsp:spPr>
+        <a:xfrm>
+          <a:off x="7229475" y="39687"/>
+          <a:ext cx="3286125" cy="1971675"/>
+        </a:xfrm>
+        <a:prstGeom prst="rect">
+          <a:avLst/>
+        </a:prstGeom>
+        <a:solidFill>
+          <a:schemeClr val="accent1">
+            <a:hueOff val="0"/>
+            <a:satOff val="0"/>
+            <a:lumOff val="0"/>
+            <a:alphaOff val="0"/>
+          </a:schemeClr>
+        </a:solidFill>
+        <a:ln w="12700" cap="flat" cmpd="sng" algn="ctr">
+          <a:solidFill>
+            <a:schemeClr val="lt1">
+              <a:hueOff val="0"/>
+              <a:satOff val="0"/>
+              <a:lumOff val="0"/>
+              <a:alphaOff val="0"/>
+            </a:schemeClr>
+          </a:solidFill>
+          <a:prstDash val="solid"/>
+          <a:miter lim="800000"/>
+        </a:ln>
+        <a:effectLst/>
+      </dsp:spPr>
+      <dsp:style>
+        <a:lnRef idx="2">
+          <a:scrgbClr r="0" g="0" b="0"/>
+        </a:lnRef>
+        <a:fillRef idx="1">
+          <a:scrgbClr r="0" g="0" b="0"/>
+        </a:fillRef>
+        <a:effectRef idx="0">
+          <a:scrgbClr r="0" g="0" b="0"/>
+        </a:effectRef>
+        <a:fontRef idx="minor">
+          <a:schemeClr val="lt1"/>
+        </a:fontRef>
+      </dsp:style>
+      <dsp:txBody>
+        <a:bodyPr spcFirstLastPara="0" vert="horz" wrap="square" lIns="114300" tIns="114300" rIns="114300" bIns="114300" numCol="1" spcCol="1270" anchor="ctr" anchorCtr="0">
+          <a:noAutofit/>
+        </a:bodyPr>
+        <a:lstStyle/>
+        <a:p>
+          <a:pPr marL="0" lvl="0" indent="0" algn="ctr" defTabSz="1333500">
+            <a:lnSpc>
+              <a:spcPct val="90000"/>
+            </a:lnSpc>
+            <a:spcBef>
+              <a:spcPct val="0"/>
+            </a:spcBef>
+            <a:spcAft>
+              <a:spcPct val="35000"/>
+            </a:spcAft>
+            <a:buNone/>
+          </a:pPr>
+          <a:r>
+            <a:rPr lang="en-US" sz="3000" kern="1200"/>
+            <a:t>Lets you use your own intellectual property (IP) safely</a:t>
+          </a:r>
+        </a:p>
+      </dsp:txBody>
+      <dsp:txXfrm>
+        <a:off x="7229475" y="39687"/>
+        <a:ext cx="3286125" cy="1971675"/>
+      </dsp:txXfrm>
+    </dsp:sp>
+    <dsp:sp modelId="{82C8B3B3-B26D-4785-91EA-7CAB05FF6DC0}">
+      <dsp:nvSpPr>
+        <dsp:cNvPr id="0" name=""/>
+        <dsp:cNvSpPr/>
+      </dsp:nvSpPr>
+      <dsp:spPr>
+        <a:xfrm>
+          <a:off x="1807368" y="2339975"/>
+          <a:ext cx="3286125" cy="1971675"/>
+        </a:xfrm>
+        <a:prstGeom prst="rect">
+          <a:avLst/>
+        </a:prstGeom>
+        <a:solidFill>
+          <a:schemeClr val="accent1">
+            <a:hueOff val="0"/>
+            <a:satOff val="0"/>
+            <a:lumOff val="0"/>
+            <a:alphaOff val="0"/>
+          </a:schemeClr>
+        </a:solidFill>
+        <a:ln w="12700" cap="flat" cmpd="sng" algn="ctr">
+          <a:solidFill>
+            <a:schemeClr val="lt1">
+              <a:hueOff val="0"/>
+              <a:satOff val="0"/>
+              <a:lumOff val="0"/>
+              <a:alphaOff val="0"/>
+            </a:schemeClr>
+          </a:solidFill>
+          <a:prstDash val="solid"/>
+          <a:miter lim="800000"/>
+        </a:ln>
+        <a:effectLst/>
+      </dsp:spPr>
+      <dsp:style>
+        <a:lnRef idx="2">
+          <a:scrgbClr r="0" g="0" b="0"/>
+        </a:lnRef>
+        <a:fillRef idx="1">
+          <a:scrgbClr r="0" g="0" b="0"/>
+        </a:fillRef>
+        <a:effectRef idx="0">
+          <a:scrgbClr r="0" g="0" b="0"/>
+        </a:effectRef>
+        <a:fontRef idx="minor">
+          <a:schemeClr val="lt1"/>
+        </a:fontRef>
+      </dsp:style>
+      <dsp:txBody>
+        <a:bodyPr spcFirstLastPara="0" vert="horz" wrap="square" lIns="114300" tIns="114300" rIns="114300" bIns="114300" numCol="1" spcCol="1270" anchor="ctr" anchorCtr="0">
+          <a:noAutofit/>
+        </a:bodyPr>
+        <a:lstStyle/>
+        <a:p>
+          <a:pPr marL="0" lvl="0" indent="0" algn="ctr" defTabSz="1333500">
+            <a:lnSpc>
+              <a:spcPct val="90000"/>
+            </a:lnSpc>
+            <a:spcBef>
+              <a:spcPct val="0"/>
+            </a:spcBef>
+            <a:spcAft>
+              <a:spcPct val="35000"/>
+            </a:spcAft>
+            <a:buNone/>
+          </a:pPr>
+          <a:r>
+            <a:rPr lang="en-US" sz="3000" kern="1200"/>
+            <a:t>Don’t need the expense, resources, and time to train a new LLM</a:t>
+          </a:r>
+        </a:p>
+      </dsp:txBody>
+      <dsp:txXfrm>
+        <a:off x="1807368" y="2339975"/>
+        <a:ext cx="3286125" cy="1971675"/>
+      </dsp:txXfrm>
+    </dsp:sp>
+    <dsp:sp modelId="{C7568179-198C-472C-949D-65D740F6E01B}">
+      <dsp:nvSpPr>
+        <dsp:cNvPr id="0" name=""/>
+        <dsp:cNvSpPr/>
+      </dsp:nvSpPr>
+      <dsp:spPr>
+        <a:xfrm>
+          <a:off x="5422106" y="2339975"/>
+          <a:ext cx="3286125" cy="1971675"/>
+        </a:xfrm>
+        <a:prstGeom prst="rect">
+          <a:avLst/>
+        </a:prstGeom>
+        <a:solidFill>
+          <a:schemeClr val="accent1">
+            <a:hueOff val="0"/>
+            <a:satOff val="0"/>
+            <a:lumOff val="0"/>
+            <a:alphaOff val="0"/>
+          </a:schemeClr>
+        </a:solidFill>
+        <a:ln w="12700" cap="flat" cmpd="sng" algn="ctr">
+          <a:solidFill>
+            <a:schemeClr val="lt1">
+              <a:hueOff val="0"/>
+              <a:satOff val="0"/>
+              <a:lumOff val="0"/>
+              <a:alphaOff val="0"/>
+            </a:schemeClr>
+          </a:solidFill>
+          <a:prstDash val="solid"/>
+          <a:miter lim="800000"/>
+        </a:ln>
+        <a:effectLst/>
+      </dsp:spPr>
+      <dsp:style>
+        <a:lnRef idx="2">
+          <a:scrgbClr r="0" g="0" b="0"/>
+        </a:lnRef>
+        <a:fillRef idx="1">
+          <a:scrgbClr r="0" g="0" b="0"/>
+        </a:fillRef>
+        <a:effectRef idx="0">
+          <a:scrgbClr r="0" g="0" b="0"/>
+        </a:effectRef>
+        <a:fontRef idx="minor">
+          <a:schemeClr val="lt1"/>
+        </a:fontRef>
+      </dsp:style>
+      <dsp:txBody>
+        <a:bodyPr spcFirstLastPara="0" vert="horz" wrap="square" lIns="114300" tIns="114300" rIns="114300" bIns="114300" numCol="1" spcCol="1270" anchor="ctr" anchorCtr="0">
+          <a:noAutofit/>
+        </a:bodyPr>
+        <a:lstStyle/>
+        <a:p>
+          <a:pPr marL="0" lvl="0" indent="0" algn="ctr" defTabSz="1333500">
+            <a:lnSpc>
+              <a:spcPct val="90000"/>
+            </a:lnSpc>
+            <a:spcBef>
+              <a:spcPct val="0"/>
+            </a:spcBef>
+            <a:spcAft>
+              <a:spcPct val="35000"/>
+            </a:spcAft>
+            <a:buNone/>
+          </a:pPr>
+          <a:r>
+            <a:rPr lang="en-US" sz="3000" kern="1200"/>
+            <a:t>Can use current data that doesn’t get stale</a:t>
+          </a:r>
+        </a:p>
+      </dsp:txBody>
+      <dsp:txXfrm>
+        <a:off x="5422106" y="2339975"/>
+        <a:ext cx="3286125" cy="1971675"/>
+      </dsp:txXfrm>
+    </dsp:sp>
+  </dsp:spTree>
+</dsp:drawing>
+</file>
+
+<file path=ppt/diagrams/drawing2.xml><?xml version="1.0" encoding="utf-8"?>
 <dsp:drawing xmlns:dgm="http://schemas.openxmlformats.org/drawingml/2006/diagram" xmlns:dsp="http://schemas.microsoft.com/office/drawing/2008/diagram" xmlns:a="http://schemas.openxmlformats.org/drawingml/2006/main">
   <dsp:spTree>
     <dsp:nvGrpSpPr>
@@ -1740,6 +3181,153 @@
 </file>
 
 <file path=ppt/diagrams/layout1.xml><?xml version="1.0" encoding="utf-8"?>
+<dgm:layoutDef xmlns:dgm="http://schemas.openxmlformats.org/drawingml/2006/diagram" xmlns:a="http://schemas.openxmlformats.org/drawingml/2006/main" uniqueId="urn:microsoft.com/office/officeart/2005/8/layout/default">
+  <dgm:title val=""/>
+  <dgm:desc val=""/>
+  <dgm:catLst>
+    <dgm:cat type="list" pri="400"/>
+  </dgm:catLst>
+  <dgm:sampData>
+    <dgm:dataModel>
+      <dgm:ptLst>
+        <dgm:pt modelId="0" type="doc"/>
+        <dgm:pt modelId="1">
+          <dgm:prSet phldr="1"/>
+        </dgm:pt>
+        <dgm:pt modelId="2">
+          <dgm:prSet phldr="1"/>
+        </dgm:pt>
+        <dgm:pt modelId="3">
+          <dgm:prSet phldr="1"/>
+        </dgm:pt>
+        <dgm:pt modelId="4">
+          <dgm:prSet phldr="1"/>
+        </dgm:pt>
+        <dgm:pt modelId="5">
+          <dgm:prSet phldr="1"/>
+        </dgm:pt>
+      </dgm:ptLst>
+      <dgm:cxnLst>
+        <dgm:cxn modelId="6" srcId="0" destId="1" srcOrd="0" destOrd="0"/>
+        <dgm:cxn modelId="7" srcId="0" destId="2" srcOrd="1" destOrd="0"/>
+        <dgm:cxn modelId="8" srcId="0" destId="3" srcOrd="2" destOrd="0"/>
+        <dgm:cxn modelId="9" srcId="0" destId="4" srcOrd="3" destOrd="0"/>
+        <dgm:cxn modelId="10" srcId="0" destId="5" srcOrd="4" destOrd="0"/>
+      </dgm:cxnLst>
+      <dgm:bg/>
+      <dgm:whole/>
+    </dgm:dataModel>
+  </dgm:sampData>
+  <dgm:styleData>
+    <dgm:dataModel>
+      <dgm:ptLst>
+        <dgm:pt modelId="0" type="doc"/>
+        <dgm:pt modelId="1"/>
+        <dgm:pt modelId="2"/>
+      </dgm:ptLst>
+      <dgm:cxnLst>
+        <dgm:cxn modelId="3" srcId="0" destId="1" srcOrd="0" destOrd="0"/>
+        <dgm:cxn modelId="4" srcId="0" destId="2" srcOrd="1" destOrd="0"/>
+      </dgm:cxnLst>
+      <dgm:bg/>
+      <dgm:whole/>
+    </dgm:dataModel>
+  </dgm:styleData>
+  <dgm:clrData>
+    <dgm:dataModel>
+      <dgm:ptLst>
+        <dgm:pt modelId="0" type="doc"/>
+        <dgm:pt modelId="1"/>
+        <dgm:pt modelId="2"/>
+        <dgm:pt modelId="3"/>
+        <dgm:pt modelId="4"/>
+        <dgm:pt modelId="5"/>
+        <dgm:pt modelId="6"/>
+      </dgm:ptLst>
+      <dgm:cxnLst>
+        <dgm:cxn modelId="7" srcId="0" destId="1" srcOrd="0" destOrd="0"/>
+        <dgm:cxn modelId="8" srcId="0" destId="2" srcOrd="1" destOrd="0"/>
+        <dgm:cxn modelId="9" srcId="0" destId="3" srcOrd="2" destOrd="0"/>
+        <dgm:cxn modelId="10" srcId="0" destId="4" srcOrd="3" destOrd="0"/>
+        <dgm:cxn modelId="11" srcId="0" destId="5" srcOrd="4" destOrd="0"/>
+        <dgm:cxn modelId="12" srcId="0" destId="6" srcOrd="5" destOrd="0"/>
+      </dgm:cxnLst>
+      <dgm:bg/>
+      <dgm:whole/>
+    </dgm:dataModel>
+  </dgm:clrData>
+  <dgm:layoutNode name="diagram">
+    <dgm:varLst>
+      <dgm:dir/>
+      <dgm:resizeHandles val="exact"/>
+    </dgm:varLst>
+    <dgm:choose name="Name0">
+      <dgm:if name="Name1" func="var" arg="dir" op="equ" val="norm">
+        <dgm:alg type="snake">
+          <dgm:param type="grDir" val="tL"/>
+          <dgm:param type="flowDir" val="row"/>
+          <dgm:param type="contDir" val="sameDir"/>
+          <dgm:param type="off" val="ctr"/>
+        </dgm:alg>
+      </dgm:if>
+      <dgm:else name="Name2">
+        <dgm:alg type="snake">
+          <dgm:param type="grDir" val="tR"/>
+          <dgm:param type="flowDir" val="row"/>
+          <dgm:param type="contDir" val="sameDir"/>
+          <dgm:param type="off" val="ctr"/>
+        </dgm:alg>
+      </dgm:else>
+    </dgm:choose>
+    <dgm:shape xmlns:r="http://schemas.openxmlformats.org/officeDocument/2006/relationships" r:blip="">
+      <dgm:adjLst/>
+    </dgm:shape>
+    <dgm:presOf/>
+    <dgm:constrLst>
+      <dgm:constr type="w" for="ch" forName="node" refType="w"/>
+      <dgm:constr type="h" for="ch" forName="node" refType="w" refFor="ch" refForName="node" fact="0.6"/>
+      <dgm:constr type="w" for="ch" forName="sibTrans" refType="w" refFor="ch" refForName="node" fact="0.1"/>
+      <dgm:constr type="sp" refType="w" refFor="ch" refForName="sibTrans"/>
+      <dgm:constr type="primFontSz" for="ch" forName="node" op="equ" val="65"/>
+    </dgm:constrLst>
+    <dgm:ruleLst/>
+    <dgm:forEach name="Name3" axis="ch" ptType="node">
+      <dgm:layoutNode name="node">
+        <dgm:varLst>
+          <dgm:bulletEnabled val="1"/>
+        </dgm:varLst>
+        <dgm:alg type="tx"/>
+        <dgm:shape xmlns:r="http://schemas.openxmlformats.org/officeDocument/2006/relationships" type="rect" r:blip="">
+          <dgm:adjLst/>
+        </dgm:shape>
+        <dgm:presOf axis="desOrSelf" ptType="node"/>
+        <dgm:constrLst>
+          <dgm:constr type="lMarg" refType="primFontSz" fact="0.3"/>
+          <dgm:constr type="rMarg" refType="primFontSz" fact="0.3"/>
+          <dgm:constr type="tMarg" refType="primFontSz" fact="0.3"/>
+          <dgm:constr type="bMarg" refType="primFontSz" fact="0.3"/>
+        </dgm:constrLst>
+        <dgm:ruleLst>
+          <dgm:rule type="primFontSz" val="5" fact="NaN" max="NaN"/>
+        </dgm:ruleLst>
+      </dgm:layoutNode>
+      <dgm:forEach name="Name4" axis="followSib" ptType="sibTrans" cnt="1">
+        <dgm:layoutNode name="sibTrans">
+          <dgm:alg type="sp"/>
+          <dgm:shape xmlns:r="http://schemas.openxmlformats.org/officeDocument/2006/relationships" r:blip="">
+            <dgm:adjLst/>
+          </dgm:shape>
+          <dgm:presOf/>
+          <dgm:constrLst/>
+          <dgm:ruleLst/>
+        </dgm:layoutNode>
+      </dgm:forEach>
+    </dgm:forEach>
+  </dgm:layoutNode>
+</dgm:layoutDef>
+</file>
+
+<file path=ppt/diagrams/layout2.xml><?xml version="1.0" encoding="utf-8"?>
 <dgm:layoutDef xmlns:dgm="http://schemas.openxmlformats.org/drawingml/2006/diagram" xmlns:a="http://schemas.openxmlformats.org/drawingml/2006/main" uniqueId="urn:microsoft.com/office/officeart/2005/8/layout/vList5">
   <dgm:title val=""/>
   <dgm:desc val=""/>
@@ -1973,6 +3561,1040 @@
 </file>
 
 <file path=ppt/diagrams/quickStyle1.xml><?xml version="1.0" encoding="utf-8"?>
+<dgm:styleDef xmlns:dgm="http://schemas.openxmlformats.org/drawingml/2006/diagram" xmlns:a="http://schemas.openxmlformats.org/drawingml/2006/main" uniqueId="urn:microsoft.com/office/officeart/2005/8/quickstyle/simple1">
+  <dgm:title val=""/>
+  <dgm:desc val=""/>
+  <dgm:catLst>
+    <dgm:cat type="simple" pri="10100"/>
+  </dgm:catLst>
+  <dgm:scene3d>
+    <a:camera prst="orthographicFront"/>
+    <a:lightRig rig="threePt" dir="t"/>
+  </dgm:scene3d>
+  <dgm:styleLbl name="node0">
+    <dgm:scene3d>
+      <a:camera prst="orthographicFront"/>
+      <a:lightRig rig="threePt" dir="t"/>
+    </dgm:scene3d>
+    <dgm:sp3d/>
+    <dgm:txPr/>
+    <dgm:style>
+      <a:lnRef idx="2">
+        <a:scrgbClr r="0" g="0" b="0"/>
+      </a:lnRef>
+      <a:fillRef idx="1">
+        <a:scrgbClr r="0" g="0" b="0"/>
+      </a:fillRef>
+      <a:effectRef idx="0">
+        <a:scrgbClr r="0" g="0" b="0"/>
+      </a:effectRef>
+      <a:fontRef idx="minor">
+        <a:schemeClr val="lt1"/>
+      </a:fontRef>
+    </dgm:style>
+  </dgm:styleLbl>
+  <dgm:styleLbl name="lnNode1">
+    <dgm:scene3d>
+      <a:camera prst="orthographicFront"/>
+      <a:lightRig rig="threePt" dir="t"/>
+    </dgm:scene3d>
+    <dgm:sp3d/>
+    <dgm:txPr/>
+    <dgm:style>
+      <a:lnRef idx="2">
+        <a:scrgbClr r="0" g="0" b="0"/>
+      </a:lnRef>
+      <a:fillRef idx="1">
+        <a:scrgbClr r="0" g="0" b="0"/>
+      </a:fillRef>
+      <a:effectRef idx="0">
+        <a:scrgbClr r="0" g="0" b="0"/>
+      </a:effectRef>
+      <a:fontRef idx="minor">
+        <a:schemeClr val="lt1"/>
+      </a:fontRef>
+    </dgm:style>
+  </dgm:styleLbl>
+  <dgm:styleLbl name="vennNode1">
+    <dgm:scene3d>
+      <a:camera prst="orthographicFront"/>
+      <a:lightRig rig="threePt" dir="t"/>
+    </dgm:scene3d>
+    <dgm:sp3d/>
+    <dgm:txPr/>
+    <dgm:style>
+      <a:lnRef idx="2">
+        <a:scrgbClr r="0" g="0" b="0"/>
+      </a:lnRef>
+      <a:fillRef idx="1">
+        <a:scrgbClr r="0" g="0" b="0"/>
+      </a:fillRef>
+      <a:effectRef idx="0">
+        <a:scrgbClr r="0" g="0" b="0"/>
+      </a:effectRef>
+      <a:fontRef idx="minor">
+        <a:schemeClr val="tx1"/>
+      </a:fontRef>
+    </dgm:style>
+  </dgm:styleLbl>
+  <dgm:styleLbl name="alignNode1">
+    <dgm:scene3d>
+      <a:camera prst="orthographicFront"/>
+      <a:lightRig rig="threePt" dir="t"/>
+    </dgm:scene3d>
+    <dgm:sp3d/>
+    <dgm:txPr/>
+    <dgm:style>
+      <a:lnRef idx="2">
+        <a:scrgbClr r="0" g="0" b="0"/>
+      </a:lnRef>
+      <a:fillRef idx="1">
+        <a:scrgbClr r="0" g="0" b="0"/>
+      </a:fillRef>
+      <a:effectRef idx="0">
+        <a:scrgbClr r="0" g="0" b="0"/>
+      </a:effectRef>
+      <a:fontRef idx="minor">
+        <a:schemeClr val="lt1"/>
+      </a:fontRef>
+    </dgm:style>
+  </dgm:styleLbl>
+  <dgm:styleLbl name="node1">
+    <dgm:scene3d>
+      <a:camera prst="orthographicFront"/>
+      <a:lightRig rig="threePt" dir="t"/>
+    </dgm:scene3d>
+    <dgm:sp3d/>
+    <dgm:txPr/>
+    <dgm:style>
+      <a:lnRef idx="2">
+        <a:scrgbClr r="0" g="0" b="0"/>
+      </a:lnRef>
+      <a:fillRef idx="1">
+        <a:scrgbClr r="0" g="0" b="0"/>
+      </a:fillRef>
+      <a:effectRef idx="0">
+        <a:scrgbClr r="0" g="0" b="0"/>
+      </a:effectRef>
+      <a:fontRef idx="minor">
+        <a:schemeClr val="lt1"/>
+      </a:fontRef>
+    </dgm:style>
+  </dgm:styleLbl>
+  <dgm:styleLbl name="node2">
+    <dgm:scene3d>
+      <a:camera prst="orthographicFront"/>
+      <a:lightRig rig="threePt" dir="t"/>
+    </dgm:scene3d>
+    <dgm:sp3d/>
+    <dgm:txPr/>
+    <dgm:style>
+      <a:lnRef idx="2">
+        <a:scrgbClr r="0" g="0" b="0"/>
+      </a:lnRef>
+      <a:fillRef idx="1">
+        <a:scrgbClr r="0" g="0" b="0"/>
+      </a:fillRef>
+      <a:effectRef idx="0">
+        <a:scrgbClr r="0" g="0" b="0"/>
+      </a:effectRef>
+      <a:fontRef idx="minor">
+        <a:schemeClr val="lt1"/>
+      </a:fontRef>
+    </dgm:style>
+  </dgm:styleLbl>
+  <dgm:styleLbl name="node3">
+    <dgm:scene3d>
+      <a:camera prst="orthographicFront"/>
+      <a:lightRig rig="threePt" dir="t"/>
+    </dgm:scene3d>
+    <dgm:sp3d/>
+    <dgm:txPr/>
+    <dgm:style>
+      <a:lnRef idx="2">
+        <a:scrgbClr r="0" g="0" b="0"/>
+      </a:lnRef>
+      <a:fillRef idx="1">
+        <a:scrgbClr r="0" g="0" b="0"/>
+      </a:fillRef>
+      <a:effectRef idx="0">
+        <a:scrgbClr r="0" g="0" b="0"/>
+      </a:effectRef>
+      <a:fontRef idx="minor">
+        <a:schemeClr val="lt1"/>
+      </a:fontRef>
+    </dgm:style>
+  </dgm:styleLbl>
+  <dgm:styleLbl name="node4">
+    <dgm:scene3d>
+      <a:camera prst="orthographicFront"/>
+      <a:lightRig rig="threePt" dir="t"/>
+    </dgm:scene3d>
+    <dgm:sp3d/>
+    <dgm:txPr/>
+    <dgm:style>
+      <a:lnRef idx="2">
+        <a:scrgbClr r="0" g="0" b="0"/>
+      </a:lnRef>
+      <a:fillRef idx="1">
+        <a:scrgbClr r="0" g="0" b="0"/>
+      </a:fillRef>
+      <a:effectRef idx="0">
+        <a:scrgbClr r="0" g="0" b="0"/>
+      </a:effectRef>
+      <a:fontRef idx="minor">
+        <a:schemeClr val="lt1"/>
+      </a:fontRef>
+    </dgm:style>
+  </dgm:styleLbl>
+  <dgm:styleLbl name="fgImgPlace1">
+    <dgm:scene3d>
+      <a:camera prst="orthographicFront"/>
+      <a:lightRig rig="threePt" dir="t"/>
+    </dgm:scene3d>
+    <dgm:sp3d/>
+    <dgm:txPr/>
+    <dgm:style>
+      <a:lnRef idx="2">
+        <a:scrgbClr r="0" g="0" b="0"/>
+      </a:lnRef>
+      <a:fillRef idx="1">
+        <a:scrgbClr r="0" g="0" b="0"/>
+      </a:fillRef>
+      <a:effectRef idx="0">
+        <a:scrgbClr r="0" g="0" b="0"/>
+      </a:effectRef>
+      <a:fontRef idx="minor"/>
+    </dgm:style>
+  </dgm:styleLbl>
+  <dgm:styleLbl name="alignImgPlace1">
+    <dgm:scene3d>
+      <a:camera prst="orthographicFront"/>
+      <a:lightRig rig="threePt" dir="t"/>
+    </dgm:scene3d>
+    <dgm:sp3d/>
+    <dgm:txPr/>
+    <dgm:style>
+      <a:lnRef idx="2">
+        <a:scrgbClr r="0" g="0" b="0"/>
+      </a:lnRef>
+      <a:fillRef idx="1">
+        <a:scrgbClr r="0" g="0" b="0"/>
+      </a:fillRef>
+      <a:effectRef idx="0">
+        <a:scrgbClr r="0" g="0" b="0"/>
+      </a:effectRef>
+      <a:fontRef idx="minor"/>
+    </dgm:style>
+  </dgm:styleLbl>
+  <dgm:styleLbl name="bgImgPlace1">
+    <dgm:scene3d>
+      <a:camera prst="orthographicFront"/>
+      <a:lightRig rig="threePt" dir="t"/>
+    </dgm:scene3d>
+    <dgm:sp3d/>
+    <dgm:txPr/>
+    <dgm:style>
+      <a:lnRef idx="2">
+        <a:scrgbClr r="0" g="0" b="0"/>
+      </a:lnRef>
+      <a:fillRef idx="1">
+        <a:scrgbClr r="0" g="0" b="0"/>
+      </a:fillRef>
+      <a:effectRef idx="0">
+        <a:scrgbClr r="0" g="0" b="0"/>
+      </a:effectRef>
+      <a:fontRef idx="minor"/>
+    </dgm:style>
+  </dgm:styleLbl>
+  <dgm:styleLbl name="sibTrans2D1">
+    <dgm:scene3d>
+      <a:camera prst="orthographicFront"/>
+      <a:lightRig rig="threePt" dir="t"/>
+    </dgm:scene3d>
+    <dgm:sp3d/>
+    <dgm:txPr/>
+    <dgm:style>
+      <a:lnRef idx="0">
+        <a:scrgbClr r="0" g="0" b="0"/>
+      </a:lnRef>
+      <a:fillRef idx="1">
+        <a:scrgbClr r="0" g="0" b="0"/>
+      </a:fillRef>
+      <a:effectRef idx="0">
+        <a:scrgbClr r="0" g="0" b="0"/>
+      </a:effectRef>
+      <a:fontRef idx="minor">
+        <a:schemeClr val="lt1"/>
+      </a:fontRef>
+    </dgm:style>
+  </dgm:styleLbl>
+  <dgm:styleLbl name="fgSibTrans2D1">
+    <dgm:scene3d>
+      <a:camera prst="orthographicFront"/>
+      <a:lightRig rig="threePt" dir="t"/>
+    </dgm:scene3d>
+    <dgm:sp3d/>
+    <dgm:txPr/>
+    <dgm:style>
+      <a:lnRef idx="0">
+        <a:scrgbClr r="0" g="0" b="0"/>
+      </a:lnRef>
+      <a:fillRef idx="1">
+        <a:scrgbClr r="0" g="0" b="0"/>
+      </a:fillRef>
+      <a:effectRef idx="0">
+        <a:scrgbClr r="0" g="0" b="0"/>
+      </a:effectRef>
+      <a:fontRef idx="minor">
+        <a:schemeClr val="lt1"/>
+      </a:fontRef>
+    </dgm:style>
+  </dgm:styleLbl>
+  <dgm:styleLbl name="bgSibTrans2D1">
+    <dgm:scene3d>
+      <a:camera prst="orthographicFront"/>
+      <a:lightRig rig="threePt" dir="t"/>
+    </dgm:scene3d>
+    <dgm:sp3d/>
+    <dgm:txPr/>
+    <dgm:style>
+      <a:lnRef idx="0">
+        <a:scrgbClr r="0" g="0" b="0"/>
+      </a:lnRef>
+      <a:fillRef idx="1">
+        <a:scrgbClr r="0" g="0" b="0"/>
+      </a:fillRef>
+      <a:effectRef idx="0">
+        <a:scrgbClr r="0" g="0" b="0"/>
+      </a:effectRef>
+      <a:fontRef idx="minor">
+        <a:schemeClr val="lt1"/>
+      </a:fontRef>
+    </dgm:style>
+  </dgm:styleLbl>
+  <dgm:styleLbl name="sibTrans1D1">
+    <dgm:scene3d>
+      <a:camera prst="orthographicFront"/>
+      <a:lightRig rig="threePt" dir="t"/>
+    </dgm:scene3d>
+    <dgm:sp3d/>
+    <dgm:txPr/>
+    <dgm:style>
+      <a:lnRef idx="1">
+        <a:scrgbClr r="0" g="0" b="0"/>
+      </a:lnRef>
+      <a:fillRef idx="0">
+        <a:scrgbClr r="0" g="0" b="0"/>
+      </a:fillRef>
+      <a:effectRef idx="0">
+        <a:scrgbClr r="0" g="0" b="0"/>
+      </a:effectRef>
+      <a:fontRef idx="minor"/>
+    </dgm:style>
+  </dgm:styleLbl>
+  <dgm:styleLbl name="callout">
+    <dgm:scene3d>
+      <a:camera prst="orthographicFront"/>
+      <a:lightRig rig="threePt" dir="t"/>
+    </dgm:scene3d>
+    <dgm:sp3d/>
+    <dgm:txPr/>
+    <dgm:style>
+      <a:lnRef idx="2">
+        <a:scrgbClr r="0" g="0" b="0"/>
+      </a:lnRef>
+      <a:fillRef idx="1">
+        <a:scrgbClr r="0" g="0" b="0"/>
+      </a:fillRef>
+      <a:effectRef idx="0">
+        <a:scrgbClr r="0" g="0" b="0"/>
+      </a:effectRef>
+      <a:fontRef idx="minor"/>
+    </dgm:style>
+  </dgm:styleLbl>
+  <dgm:styleLbl name="asst0">
+    <dgm:scene3d>
+      <a:camera prst="orthographicFront"/>
+      <a:lightRig rig="threePt" dir="t"/>
+    </dgm:scene3d>
+    <dgm:sp3d/>
+    <dgm:txPr/>
+    <dgm:style>
+      <a:lnRef idx="2">
+        <a:scrgbClr r="0" g="0" b="0"/>
+      </a:lnRef>
+      <a:fillRef idx="1">
+        <a:scrgbClr r="0" g="0" b="0"/>
+      </a:fillRef>
+      <a:effectRef idx="0">
+        <a:scrgbClr r="0" g="0" b="0"/>
+      </a:effectRef>
+      <a:fontRef idx="minor">
+        <a:schemeClr val="lt1"/>
+      </a:fontRef>
+    </dgm:style>
+  </dgm:styleLbl>
+  <dgm:styleLbl name="asst1">
+    <dgm:scene3d>
+      <a:camera prst="orthographicFront"/>
+      <a:lightRig rig="threePt" dir="t"/>
+    </dgm:scene3d>
+    <dgm:sp3d/>
+    <dgm:txPr/>
+    <dgm:style>
+      <a:lnRef idx="2">
+        <a:scrgbClr r="0" g="0" b="0"/>
+      </a:lnRef>
+      <a:fillRef idx="1">
+        <a:scrgbClr r="0" g="0" b="0"/>
+      </a:fillRef>
+      <a:effectRef idx="0">
+        <a:scrgbClr r="0" g="0" b="0"/>
+      </a:effectRef>
+      <a:fontRef idx="minor">
+        <a:schemeClr val="lt1"/>
+      </a:fontRef>
+    </dgm:style>
+  </dgm:styleLbl>
+  <dgm:styleLbl name="asst2">
+    <dgm:scene3d>
+      <a:camera prst="orthographicFront"/>
+      <a:lightRig rig="threePt" dir="t"/>
+    </dgm:scene3d>
+    <dgm:sp3d/>
+    <dgm:txPr/>
+    <dgm:style>
+      <a:lnRef idx="2">
+        <a:scrgbClr r="0" g="0" b="0"/>
+      </a:lnRef>
+      <a:fillRef idx="1">
+        <a:scrgbClr r="0" g="0" b="0"/>
+      </a:fillRef>
+      <a:effectRef idx="0">
+        <a:scrgbClr r="0" g="0" b="0"/>
+      </a:effectRef>
+      <a:fontRef idx="minor">
+        <a:schemeClr val="lt1"/>
+      </a:fontRef>
+    </dgm:style>
+  </dgm:styleLbl>
+  <dgm:styleLbl name="asst3">
+    <dgm:scene3d>
+      <a:camera prst="orthographicFront"/>
+      <a:lightRig rig="threePt" dir="t"/>
+    </dgm:scene3d>
+    <dgm:sp3d/>
+    <dgm:txPr/>
+    <dgm:style>
+      <a:lnRef idx="2">
+        <a:scrgbClr r="0" g="0" b="0"/>
+      </a:lnRef>
+      <a:fillRef idx="1">
+        <a:scrgbClr r="0" g="0" b="0"/>
+      </a:fillRef>
+      <a:effectRef idx="0">
+        <a:scrgbClr r="0" g="0" b="0"/>
+      </a:effectRef>
+      <a:fontRef idx="minor">
+        <a:schemeClr val="lt1"/>
+      </a:fontRef>
+    </dgm:style>
+  </dgm:styleLbl>
+  <dgm:styleLbl name="asst4">
+    <dgm:scene3d>
+      <a:camera prst="orthographicFront"/>
+      <a:lightRig rig="threePt" dir="t"/>
+    </dgm:scene3d>
+    <dgm:sp3d/>
+    <dgm:txPr/>
+    <dgm:style>
+      <a:lnRef idx="2">
+        <a:scrgbClr r="0" g="0" b="0"/>
+      </a:lnRef>
+      <a:fillRef idx="1">
+        <a:scrgbClr r="0" g="0" b="0"/>
+      </a:fillRef>
+      <a:effectRef idx="0">
+        <a:scrgbClr r="0" g="0" b="0"/>
+      </a:effectRef>
+      <a:fontRef idx="minor">
+        <a:schemeClr val="lt1"/>
+      </a:fontRef>
+    </dgm:style>
+  </dgm:styleLbl>
+  <dgm:styleLbl name="parChTrans2D1">
+    <dgm:scene3d>
+      <a:camera prst="orthographicFront"/>
+      <a:lightRig rig="threePt" dir="t"/>
+    </dgm:scene3d>
+    <dgm:sp3d/>
+    <dgm:txPr/>
+    <dgm:style>
+      <a:lnRef idx="2">
+        <a:scrgbClr r="0" g="0" b="0"/>
+      </a:lnRef>
+      <a:fillRef idx="1">
+        <a:scrgbClr r="0" g="0" b="0"/>
+      </a:fillRef>
+      <a:effectRef idx="0">
+        <a:scrgbClr r="0" g="0" b="0"/>
+      </a:effectRef>
+      <a:fontRef idx="minor">
+        <a:schemeClr val="lt1"/>
+      </a:fontRef>
+    </dgm:style>
+  </dgm:styleLbl>
+  <dgm:styleLbl name="parChTrans2D2">
+    <dgm:scene3d>
+      <a:camera prst="orthographicFront"/>
+      <a:lightRig rig="threePt" dir="t"/>
+    </dgm:scene3d>
+    <dgm:sp3d/>
+    <dgm:txPr/>
+    <dgm:style>
+      <a:lnRef idx="2">
+        <a:scrgbClr r="0" g="0" b="0"/>
+      </a:lnRef>
+      <a:fillRef idx="1">
+        <a:scrgbClr r="0" g="0" b="0"/>
+      </a:fillRef>
+      <a:effectRef idx="0">
+        <a:scrgbClr r="0" g="0" b="0"/>
+      </a:effectRef>
+      <a:fontRef idx="minor">
+        <a:schemeClr val="lt1"/>
+      </a:fontRef>
+    </dgm:style>
+  </dgm:styleLbl>
+  <dgm:styleLbl name="parChTrans2D3">
+    <dgm:scene3d>
+      <a:camera prst="orthographicFront"/>
+      <a:lightRig rig="threePt" dir="t"/>
+    </dgm:scene3d>
+    <dgm:sp3d/>
+    <dgm:txPr/>
+    <dgm:style>
+      <a:lnRef idx="2">
+        <a:scrgbClr r="0" g="0" b="0"/>
+      </a:lnRef>
+      <a:fillRef idx="1">
+        <a:scrgbClr r="0" g="0" b="0"/>
+      </a:fillRef>
+      <a:effectRef idx="0">
+        <a:scrgbClr r="0" g="0" b="0"/>
+      </a:effectRef>
+      <a:fontRef idx="minor">
+        <a:schemeClr val="lt1"/>
+      </a:fontRef>
+    </dgm:style>
+  </dgm:styleLbl>
+  <dgm:styleLbl name="parChTrans2D4">
+    <dgm:scene3d>
+      <a:camera prst="orthographicFront"/>
+      <a:lightRig rig="threePt" dir="t"/>
+    </dgm:scene3d>
+    <dgm:sp3d/>
+    <dgm:txPr/>
+    <dgm:style>
+      <a:lnRef idx="2">
+        <a:scrgbClr r="0" g="0" b="0"/>
+      </a:lnRef>
+      <a:fillRef idx="1">
+        <a:scrgbClr r="0" g="0" b="0"/>
+      </a:fillRef>
+      <a:effectRef idx="0">
+        <a:scrgbClr r="0" g="0" b="0"/>
+      </a:effectRef>
+      <a:fontRef idx="minor">
+        <a:schemeClr val="lt1"/>
+      </a:fontRef>
+    </dgm:style>
+  </dgm:styleLbl>
+  <dgm:styleLbl name="parChTrans1D1">
+    <dgm:scene3d>
+      <a:camera prst="orthographicFront"/>
+      <a:lightRig rig="threePt" dir="t"/>
+    </dgm:scene3d>
+    <dgm:sp3d/>
+    <dgm:txPr/>
+    <dgm:style>
+      <a:lnRef idx="2">
+        <a:scrgbClr r="0" g="0" b="0"/>
+      </a:lnRef>
+      <a:fillRef idx="0">
+        <a:scrgbClr r="0" g="0" b="0"/>
+      </a:fillRef>
+      <a:effectRef idx="0">
+        <a:scrgbClr r="0" g="0" b="0"/>
+      </a:effectRef>
+      <a:fontRef idx="minor"/>
+    </dgm:style>
+  </dgm:styleLbl>
+  <dgm:styleLbl name="parChTrans1D2">
+    <dgm:scene3d>
+      <a:camera prst="orthographicFront"/>
+      <a:lightRig rig="threePt" dir="t"/>
+    </dgm:scene3d>
+    <dgm:sp3d/>
+    <dgm:txPr/>
+    <dgm:style>
+      <a:lnRef idx="2">
+        <a:scrgbClr r="0" g="0" b="0"/>
+      </a:lnRef>
+      <a:fillRef idx="0">
+        <a:scrgbClr r="0" g="0" b="0"/>
+      </a:fillRef>
+      <a:effectRef idx="0">
+        <a:scrgbClr r="0" g="0" b="0"/>
+      </a:effectRef>
+      <a:fontRef idx="minor"/>
+    </dgm:style>
+  </dgm:styleLbl>
+  <dgm:styleLbl name="parChTrans1D3">
+    <dgm:scene3d>
+      <a:camera prst="orthographicFront"/>
+      <a:lightRig rig="threePt" dir="t"/>
+    </dgm:scene3d>
+    <dgm:sp3d/>
+    <dgm:txPr/>
+    <dgm:style>
+      <a:lnRef idx="2">
+        <a:scrgbClr r="0" g="0" b="0"/>
+      </a:lnRef>
+      <a:fillRef idx="0">
+        <a:scrgbClr r="0" g="0" b="0"/>
+      </a:fillRef>
+      <a:effectRef idx="0">
+        <a:scrgbClr r="0" g="0" b="0"/>
+      </a:effectRef>
+      <a:fontRef idx="minor"/>
+    </dgm:style>
+  </dgm:styleLbl>
+  <dgm:styleLbl name="parChTrans1D4">
+    <dgm:scene3d>
+      <a:camera prst="orthographicFront"/>
+      <a:lightRig rig="threePt" dir="t"/>
+    </dgm:scene3d>
+    <dgm:sp3d/>
+    <dgm:txPr/>
+    <dgm:style>
+      <a:lnRef idx="2">
+        <a:scrgbClr r="0" g="0" b="0"/>
+      </a:lnRef>
+      <a:fillRef idx="0">
+        <a:scrgbClr r="0" g="0" b="0"/>
+      </a:fillRef>
+      <a:effectRef idx="0">
+        <a:scrgbClr r="0" g="0" b="0"/>
+      </a:effectRef>
+      <a:fontRef idx="minor"/>
+    </dgm:style>
+  </dgm:styleLbl>
+  <dgm:styleLbl name="fgAcc1">
+    <dgm:scene3d>
+      <a:camera prst="orthographicFront"/>
+      <a:lightRig rig="threePt" dir="t"/>
+    </dgm:scene3d>
+    <dgm:sp3d/>
+    <dgm:txPr/>
+    <dgm:style>
+      <a:lnRef idx="2">
+        <a:scrgbClr r="0" g="0" b="0"/>
+      </a:lnRef>
+      <a:fillRef idx="1">
+        <a:scrgbClr r="0" g="0" b="0"/>
+      </a:fillRef>
+      <a:effectRef idx="0">
+        <a:scrgbClr r="0" g="0" b="0"/>
+      </a:effectRef>
+      <a:fontRef idx="minor"/>
+    </dgm:style>
+  </dgm:styleLbl>
+  <dgm:styleLbl name="conFgAcc1">
+    <dgm:scene3d>
+      <a:camera prst="orthographicFront"/>
+      <a:lightRig rig="threePt" dir="t"/>
+    </dgm:scene3d>
+    <dgm:sp3d/>
+    <dgm:txPr/>
+    <dgm:style>
+      <a:lnRef idx="2">
+        <a:scrgbClr r="0" g="0" b="0"/>
+      </a:lnRef>
+      <a:fillRef idx="1">
+        <a:scrgbClr r="0" g="0" b="0"/>
+      </a:fillRef>
+      <a:effectRef idx="0">
+        <a:scrgbClr r="0" g="0" b="0"/>
+      </a:effectRef>
+      <a:fontRef idx="minor"/>
+    </dgm:style>
+  </dgm:styleLbl>
+  <dgm:styleLbl name="alignAcc1">
+    <dgm:scene3d>
+      <a:camera prst="orthographicFront"/>
+      <a:lightRig rig="threePt" dir="t"/>
+    </dgm:scene3d>
+    <dgm:sp3d/>
+    <dgm:txPr/>
+    <dgm:style>
+      <a:lnRef idx="2">
+        <a:scrgbClr r="0" g="0" b="0"/>
+      </a:lnRef>
+      <a:fillRef idx="1">
+        <a:scrgbClr r="0" g="0" b="0"/>
+      </a:fillRef>
+      <a:effectRef idx="0">
+        <a:scrgbClr r="0" g="0" b="0"/>
+      </a:effectRef>
+      <a:fontRef idx="minor"/>
+    </dgm:style>
+  </dgm:styleLbl>
+  <dgm:styleLbl name="trAlignAcc1">
+    <dgm:scene3d>
+      <a:camera prst="orthographicFront"/>
+      <a:lightRig rig="threePt" dir="t"/>
+    </dgm:scene3d>
+    <dgm:sp3d/>
+    <dgm:txPr/>
+    <dgm:style>
+      <a:lnRef idx="1">
+        <a:scrgbClr r="0" g="0" b="0"/>
+      </a:lnRef>
+      <a:fillRef idx="1">
+        <a:scrgbClr r="0" g="0" b="0"/>
+      </a:fillRef>
+      <a:effectRef idx="0">
+        <a:scrgbClr r="0" g="0" b="0"/>
+      </a:effectRef>
+      <a:fontRef idx="minor"/>
+    </dgm:style>
+  </dgm:styleLbl>
+  <dgm:styleLbl name="bgAcc1">
+    <dgm:scene3d>
+      <a:camera prst="orthographicFront"/>
+      <a:lightRig rig="threePt" dir="t"/>
+    </dgm:scene3d>
+    <dgm:sp3d/>
+    <dgm:txPr/>
+    <dgm:style>
+      <a:lnRef idx="2">
+        <a:scrgbClr r="0" g="0" b="0"/>
+      </a:lnRef>
+      <a:fillRef idx="1">
+        <a:scrgbClr r="0" g="0" b="0"/>
+      </a:fillRef>
+      <a:effectRef idx="0">
+        <a:scrgbClr r="0" g="0" b="0"/>
+      </a:effectRef>
+      <a:fontRef idx="minor"/>
+    </dgm:style>
+  </dgm:styleLbl>
+  <dgm:styleLbl name="solidFgAcc1">
+    <dgm:scene3d>
+      <a:camera prst="orthographicFront"/>
+      <a:lightRig rig="threePt" dir="t"/>
+    </dgm:scene3d>
+    <dgm:sp3d/>
+    <dgm:txPr/>
+    <dgm:style>
+      <a:lnRef idx="2">
+        <a:scrgbClr r="0" g="0" b="0"/>
+      </a:lnRef>
+      <a:fillRef idx="1">
+        <a:scrgbClr r="0" g="0" b="0"/>
+      </a:fillRef>
+      <a:effectRef idx="0">
+        <a:scrgbClr r="0" g="0" b="0"/>
+      </a:effectRef>
+      <a:fontRef idx="minor"/>
+    </dgm:style>
+  </dgm:styleLbl>
+  <dgm:styleLbl name="solidAlignAcc1">
+    <dgm:scene3d>
+      <a:camera prst="orthographicFront"/>
+      <a:lightRig rig="threePt" dir="t"/>
+    </dgm:scene3d>
+    <dgm:sp3d/>
+    <dgm:txPr/>
+    <dgm:style>
+      <a:lnRef idx="2">
+        <a:scrgbClr r="0" g="0" b="0"/>
+      </a:lnRef>
+      <a:fillRef idx="1">
+        <a:scrgbClr r="0" g="0" b="0"/>
+      </a:fillRef>
+      <a:effectRef idx="0">
+        <a:scrgbClr r="0" g="0" b="0"/>
+      </a:effectRef>
+      <a:fontRef idx="minor"/>
+    </dgm:style>
+  </dgm:styleLbl>
+  <dgm:styleLbl name="solidBgAcc1">
+    <dgm:scene3d>
+      <a:camera prst="orthographicFront"/>
+      <a:lightRig rig="threePt" dir="t"/>
+    </dgm:scene3d>
+    <dgm:sp3d/>
+    <dgm:txPr/>
+    <dgm:style>
+      <a:lnRef idx="2">
+        <a:scrgbClr r="0" g="0" b="0"/>
+      </a:lnRef>
+      <a:fillRef idx="1">
+        <a:scrgbClr r="0" g="0" b="0"/>
+      </a:fillRef>
+      <a:effectRef idx="0">
+        <a:scrgbClr r="0" g="0" b="0"/>
+      </a:effectRef>
+      <a:fontRef idx="minor"/>
+    </dgm:style>
+  </dgm:styleLbl>
+  <dgm:styleLbl name="fgAccFollowNode1">
+    <dgm:scene3d>
+      <a:camera prst="orthographicFront"/>
+      <a:lightRig rig="threePt" dir="t"/>
+    </dgm:scene3d>
+    <dgm:sp3d/>
+    <dgm:txPr/>
+    <dgm:style>
+      <a:lnRef idx="2">
+        <a:scrgbClr r="0" g="0" b="0"/>
+      </a:lnRef>
+      <a:fillRef idx="1">
+        <a:scrgbClr r="0" g="0" b="0"/>
+      </a:fillRef>
+      <a:effectRef idx="0">
+        <a:scrgbClr r="0" g="0" b="0"/>
+      </a:effectRef>
+      <a:fontRef idx="minor"/>
+    </dgm:style>
+  </dgm:styleLbl>
+  <dgm:styleLbl name="alignAccFollowNode1">
+    <dgm:scene3d>
+      <a:camera prst="orthographicFront"/>
+      <a:lightRig rig="threePt" dir="t"/>
+    </dgm:scene3d>
+    <dgm:sp3d/>
+    <dgm:txPr/>
+    <dgm:style>
+      <a:lnRef idx="2">
+        <a:scrgbClr r="0" g="0" b="0"/>
+      </a:lnRef>
+      <a:fillRef idx="1">
+        <a:scrgbClr r="0" g="0" b="0"/>
+      </a:fillRef>
+      <a:effectRef idx="0">
+        <a:scrgbClr r="0" g="0" b="0"/>
+      </a:effectRef>
+      <a:fontRef idx="minor"/>
+    </dgm:style>
+  </dgm:styleLbl>
+  <dgm:styleLbl name="bgAccFollowNode1">
+    <dgm:scene3d>
+      <a:camera prst="orthographicFront"/>
+      <a:lightRig rig="threePt" dir="t"/>
+    </dgm:scene3d>
+    <dgm:sp3d/>
+    <dgm:txPr/>
+    <dgm:style>
+      <a:lnRef idx="2">
+        <a:scrgbClr r="0" g="0" b="0"/>
+      </a:lnRef>
+      <a:fillRef idx="1">
+        <a:scrgbClr r="0" g="0" b="0"/>
+      </a:fillRef>
+      <a:effectRef idx="0">
+        <a:scrgbClr r="0" g="0" b="0"/>
+      </a:effectRef>
+      <a:fontRef idx="minor"/>
+    </dgm:style>
+  </dgm:styleLbl>
+  <dgm:styleLbl name="fgAcc0">
+    <dgm:scene3d>
+      <a:camera prst="orthographicFront"/>
+      <a:lightRig rig="threePt" dir="t"/>
+    </dgm:scene3d>
+    <dgm:sp3d/>
+    <dgm:txPr/>
+    <dgm:style>
+      <a:lnRef idx="2">
+        <a:scrgbClr r="0" g="0" b="0"/>
+      </a:lnRef>
+      <a:fillRef idx="1">
+        <a:scrgbClr r="0" g="0" b="0"/>
+      </a:fillRef>
+      <a:effectRef idx="0">
+        <a:scrgbClr r="0" g="0" b="0"/>
+      </a:effectRef>
+      <a:fontRef idx="minor"/>
+    </dgm:style>
+  </dgm:styleLbl>
+  <dgm:styleLbl name="fgAcc2">
+    <dgm:scene3d>
+      <a:camera prst="orthographicFront"/>
+      <a:lightRig rig="threePt" dir="t"/>
+    </dgm:scene3d>
+    <dgm:sp3d/>
+    <dgm:txPr/>
+    <dgm:style>
+      <a:lnRef idx="2">
+        <a:scrgbClr r="0" g="0" b="0"/>
+      </a:lnRef>
+      <a:fillRef idx="1">
+        <a:scrgbClr r="0" g="0" b="0"/>
+      </a:fillRef>
+      <a:effectRef idx="0">
+        <a:scrgbClr r="0" g="0" b="0"/>
+      </a:effectRef>
+      <a:fontRef idx="minor"/>
+    </dgm:style>
+  </dgm:styleLbl>
+  <dgm:styleLbl name="fgAcc3">
+    <dgm:scene3d>
+      <a:camera prst="orthographicFront"/>
+      <a:lightRig rig="threePt" dir="t"/>
+    </dgm:scene3d>
+    <dgm:sp3d/>
+    <dgm:txPr/>
+    <dgm:style>
+      <a:lnRef idx="2">
+        <a:scrgbClr r="0" g="0" b="0"/>
+      </a:lnRef>
+      <a:fillRef idx="1">
+        <a:scrgbClr r="0" g="0" b="0"/>
+      </a:fillRef>
+      <a:effectRef idx="0">
+        <a:scrgbClr r="0" g="0" b="0"/>
+      </a:effectRef>
+      <a:fontRef idx="minor"/>
+    </dgm:style>
+  </dgm:styleLbl>
+  <dgm:styleLbl name="fgAcc4">
+    <dgm:scene3d>
+      <a:camera prst="orthographicFront"/>
+      <a:lightRig rig="threePt" dir="t"/>
+    </dgm:scene3d>
+    <dgm:sp3d/>
+    <dgm:txPr/>
+    <dgm:style>
+      <a:lnRef idx="2">
+        <a:scrgbClr r="0" g="0" b="0"/>
+      </a:lnRef>
+      <a:fillRef idx="1">
+        <a:scrgbClr r="0" g="0" b="0"/>
+      </a:fillRef>
+      <a:effectRef idx="0">
+        <a:scrgbClr r="0" g="0" b="0"/>
+      </a:effectRef>
+      <a:fontRef idx="minor"/>
+    </dgm:style>
+  </dgm:styleLbl>
+  <dgm:styleLbl name="bgShp">
+    <dgm:scene3d>
+      <a:camera prst="orthographicFront"/>
+      <a:lightRig rig="threePt" dir="t"/>
+    </dgm:scene3d>
+    <dgm:sp3d/>
+    <dgm:txPr/>
+    <dgm:style>
+      <a:lnRef idx="0">
+        <a:scrgbClr r="0" g="0" b="0"/>
+      </a:lnRef>
+      <a:fillRef idx="1">
+        <a:scrgbClr r="0" g="0" b="0"/>
+      </a:fillRef>
+      <a:effectRef idx="0">
+        <a:scrgbClr r="0" g="0" b="0"/>
+      </a:effectRef>
+      <a:fontRef idx="minor"/>
+    </dgm:style>
+  </dgm:styleLbl>
+  <dgm:styleLbl name="dkBgShp">
+    <dgm:scene3d>
+      <a:camera prst="orthographicFront"/>
+      <a:lightRig rig="threePt" dir="t"/>
+    </dgm:scene3d>
+    <dgm:sp3d/>
+    <dgm:txPr/>
+    <dgm:style>
+      <a:lnRef idx="0">
+        <a:scrgbClr r="0" g="0" b="0"/>
+      </a:lnRef>
+      <a:fillRef idx="1">
+        <a:scrgbClr r="0" g="0" b="0"/>
+      </a:fillRef>
+      <a:effectRef idx="0">
+        <a:scrgbClr r="0" g="0" b="0"/>
+      </a:effectRef>
+      <a:fontRef idx="minor"/>
+    </dgm:style>
+  </dgm:styleLbl>
+  <dgm:styleLbl name="trBgShp">
+    <dgm:scene3d>
+      <a:camera prst="orthographicFront"/>
+      <a:lightRig rig="threePt" dir="t"/>
+    </dgm:scene3d>
+    <dgm:sp3d/>
+    <dgm:txPr/>
+    <dgm:style>
+      <a:lnRef idx="0">
+        <a:scrgbClr r="0" g="0" b="0"/>
+      </a:lnRef>
+      <a:fillRef idx="1">
+        <a:scrgbClr r="0" g="0" b="0"/>
+      </a:fillRef>
+      <a:effectRef idx="0">
+        <a:scrgbClr r="0" g="0" b="0"/>
+      </a:effectRef>
+      <a:fontRef idx="minor"/>
+    </dgm:style>
+  </dgm:styleLbl>
+  <dgm:styleLbl name="fgShp">
+    <dgm:scene3d>
+      <a:camera prst="orthographicFront"/>
+      <a:lightRig rig="threePt" dir="t"/>
+    </dgm:scene3d>
+    <dgm:sp3d/>
+    <dgm:txPr/>
+    <dgm:style>
+      <a:lnRef idx="2">
+        <a:scrgbClr r="0" g="0" b="0"/>
+      </a:lnRef>
+      <a:fillRef idx="1">
+        <a:scrgbClr r="0" g="0" b="0"/>
+      </a:fillRef>
+      <a:effectRef idx="0">
+        <a:scrgbClr r="0" g="0" b="0"/>
+      </a:effectRef>
+      <a:fontRef idx="minor"/>
+    </dgm:style>
+  </dgm:styleLbl>
+  <dgm:styleLbl name="revTx">
+    <dgm:scene3d>
+      <a:camera prst="orthographicFront"/>
+      <a:lightRig rig="threePt" dir="t"/>
+    </dgm:scene3d>
+    <dgm:sp3d/>
+    <dgm:txPr/>
+    <dgm:style>
+      <a:lnRef idx="0">
+        <a:scrgbClr r="0" g="0" b="0"/>
+      </a:lnRef>
+      <a:fillRef idx="0">
+        <a:scrgbClr r="0" g="0" b="0"/>
+      </a:fillRef>
+      <a:effectRef idx="0">
+        <a:scrgbClr r="0" g="0" b="0"/>
+      </a:effectRef>
+      <a:fontRef idx="minor"/>
+    </dgm:style>
+  </dgm:styleLbl>
+</dgm:styleDef>
+</file>
+
+<file path=ppt/diagrams/quickStyle2.xml><?xml version="1.0" encoding="utf-8"?>
 <dgm:styleDef xmlns:dgm="http://schemas.openxmlformats.org/drawingml/2006/diagram" xmlns:a="http://schemas.openxmlformats.org/drawingml/2006/main" uniqueId="urn:microsoft.com/office/officeart/2005/8/quickstyle/simple1">
   <dgm:title val=""/>
   <dgm:desc val=""/>
@@ -6956,12 +9578,19 @@
               <a:rPr lang="en-US" dirty="0">
                 <a:hlinkClick r:id="rId5"/>
               </a:rPr>
-              <a:t>https://generellem.ai/</a:t>
+              <a:t>https://generellem.ai</a:t>
             </a:r>
             <a:r>
-              <a:rPr lang="en-US" dirty="0"/>
+              <a:rPr lang="en-US">
+                <a:hlinkClick r:id="rId5"/>
+              </a:rPr>
+              <a:t>/</a:t>
+            </a:r>
+            <a:r>
+              <a:rPr lang="en-US"/>
               <a:t> </a:t>
             </a:r>
+            <a:endParaRPr lang="en-US" dirty="0"/>
           </a:p>
         </p:txBody>
       </p:sp>
@@ -7055,19 +9684,8 @@
                 <a:ea typeface="Calibri"/>
                 <a:cs typeface="Calibri"/>
               </a:rPr>
-              <a:t>What is Retrieval </a:t>
+              <a:t>What is Retrieval Augmented Generation (RAG)?</a:t>
             </a:r>
-            <a:r>
-              <a:rPr lang="en-US">
-                <a:ea typeface="Calibri"/>
-                <a:cs typeface="Calibri"/>
-              </a:rPr>
-              <a:t>Augmented Generation (RAG)</a:t>
-            </a:r>
-            <a:endParaRPr lang="en-US" dirty="0">
-              <a:ea typeface="Calibri"/>
-              <a:cs typeface="Calibri"/>
-            </a:endParaRPr>
           </a:p>
           <a:p>
             <a:r>
@@ -7370,61 +9988,37 @@
           </a:p>
         </p:txBody>
       </p:sp>
-      <p:sp>
-        <p:nvSpPr>
-          <p:cNvPr id="3" name="Content Placeholder 2">
+      <p:graphicFrame>
+        <p:nvGraphicFramePr>
+          <p:cNvPr id="5" name="Content Placeholder 4">
             <a:extLst>
               <a:ext uri="{FF2B5EF4-FFF2-40B4-BE49-F238E27FC236}">
-                <a16:creationId xmlns:a16="http://schemas.microsoft.com/office/drawing/2014/main" id="{8307BD19-032F-2BE9-8813-D18D11438447}"/>
+                <a16:creationId xmlns:a16="http://schemas.microsoft.com/office/drawing/2014/main" id="{6F8E5ED3-4DF7-0B34-0567-A8C11511470A}"/>
               </a:ext>
             </a:extLst>
           </p:cNvPr>
-          <p:cNvSpPr>
-            <a:spLocks noGrp="1"/>
-          </p:cNvSpPr>
+          <p:cNvGraphicFramePr>
+            <a:graphicFrameLocks noGrp="1"/>
+          </p:cNvGraphicFramePr>
           <p:nvPr>
             <p:ph idx="1"/>
+            <p:extLst>
+              <p:ext uri="{D42A27DB-BD31-4B8C-83A1-F6EECF244321}">
+                <p14:modId xmlns:p14="http://schemas.microsoft.com/office/powerpoint/2010/main" val="3392245062"/>
+              </p:ext>
+            </p:extLst>
           </p:nvPr>
-        </p:nvSpPr>
-        <p:spPr/>
-        <p:txBody>
-          <a:bodyPr/>
-          <a:lstStyle/>
-          <a:p>
-            <a:r>
-              <a:rPr lang="en-US" dirty="0"/>
-              <a:t>Improves the quality of the response</a:t>
-            </a:r>
-          </a:p>
-          <a:p>
-            <a:r>
-              <a:rPr lang="en-US" dirty="0"/>
-              <a:t>Adds information that the LLM doesn’t know about</a:t>
-            </a:r>
-          </a:p>
-          <a:p>
-            <a:r>
-              <a:rPr lang="en-US" dirty="0"/>
-              <a:t>Lets you use your own intellectual property (IP) safely</a:t>
-            </a:r>
-          </a:p>
-          <a:p>
-            <a:r>
-              <a:rPr lang="en-US" dirty="0"/>
-              <a:t>Don’t need the expense, resources, and time to train a new LLM</a:t>
-            </a:r>
-          </a:p>
-          <a:p>
-            <a:r>
-              <a:rPr lang="en-US" dirty="0"/>
-              <a:t>Can use current data that doesn’t get stale</a:t>
-            </a:r>
-          </a:p>
-          <a:p>
-            <a:endParaRPr lang="en-US" dirty="0"/>
-          </a:p>
-        </p:txBody>
-      </p:sp>
+        </p:nvGraphicFramePr>
+        <p:xfrm>
+          <a:off x="838200" y="1825625"/>
+          <a:ext cx="10515600" cy="4351338"/>
+        </p:xfrm>
+        <a:graphic>
+          <a:graphicData uri="http://schemas.openxmlformats.org/drawingml/2006/diagram">
+            <dgm:relIds xmlns:dgm="http://schemas.openxmlformats.org/drawingml/2006/diagram" xmlns:r="http://schemas.openxmlformats.org/officeDocument/2006/relationships" r:dm="rId2" r:lo="rId3" r:qs="rId4" r:cs="rId5"/>
+          </a:graphicData>
+        </a:graphic>
+      </p:graphicFrame>
     </p:spTree>
     <p:extLst>
       <p:ext uri="{BB962C8B-B14F-4D97-AF65-F5344CB8AC3E}">

</xml_diff>

<commit_message>
Fixed bug in PowerPoint using file system, rather than stream.
</commit_message>
<xml_diff>
--- a/Documentation/AcronymSoup.pptx
+++ b/Documentation/AcronymSoup.pptx
@@ -2099,7 +2099,7 @@
 <dgm:dataModel xmlns:dgm="http://schemas.openxmlformats.org/drawingml/2006/diagram" xmlns:a="http://schemas.openxmlformats.org/drawingml/2006/main">
   <dgm:ptLst>
     <dgm:pt modelId="{0AB57387-677A-47E1-836A-0FBAD2B5BA43}" type="doc">
-      <dgm:prSet loTypeId="urn:microsoft.com/office/officeart/2005/8/layout/vList5" loCatId="list" qsTypeId="urn:microsoft.com/office/officeart/2005/8/quickstyle/simple1" qsCatId="simple" csTypeId="urn:microsoft.com/office/officeart/2005/8/colors/accent1_2" csCatId="accent1"/>
+      <dgm:prSet loTypeId="urn:microsoft.com/office/officeart/2005/8/layout/vList5" loCatId="list" qsTypeId="urn:microsoft.com/office/officeart/2005/8/quickstyle/simple1" qsCatId="simple" csTypeId="urn:microsoft.com/office/officeart/2005/8/colors/accent1_2" csCatId="accent1" phldr="1"/>
       <dgm:spPr/>
       <dgm:t>
         <a:bodyPr/>
@@ -2153,8 +2153,8 @@
         <a:lstStyle/>
         <a:p>
           <a:r>
-            <a:rPr lang="en-US"/>
-            <a:t>You specify what documens</a:t>
+            <a:rPr lang="en-US" dirty="0"/>
+            <a:t>You specify what documents</a:t>
           </a:r>
         </a:p>
       </dgm:t>
@@ -2189,8 +2189,8 @@
         <a:lstStyle/>
         <a:p>
           <a:r>
-            <a:rPr lang="en-US"/>
-            <a:t>Initial ingestion does is full scan </a:t>
+            <a:rPr lang="en-US" dirty="0"/>
+            <a:t>Initial ingestion does a full scan </a:t>
           </a:r>
         </a:p>
       </dgm:t>
@@ -2894,8 +2894,8 @@
             <a:buChar char="•"/>
           </a:pPr>
           <a:r>
-            <a:rPr lang="en-US" sz="3600" kern="1200"/>
-            <a:t>You specify what documens</a:t>
+            <a:rPr lang="en-US" sz="3600" kern="1200" dirty="0"/>
+            <a:t>You specify what documents</a:t>
           </a:r>
         </a:p>
         <a:p>
@@ -2912,8 +2912,8 @@
             <a:buChar char="•"/>
           </a:pPr>
           <a:r>
-            <a:rPr lang="en-US" sz="3600" kern="1200"/>
-            <a:t>Initial ingestion does is full scan </a:t>
+            <a:rPr lang="en-US" sz="3600" kern="1200" dirty="0"/>
+            <a:t>Initial ingestion does a full scan </a:t>
           </a:r>
         </a:p>
       </dsp:txBody>
@@ -5710,7 +5710,7 @@
           <a:p>
             <a:fld id="{35863F67-254C-4920-A3F3-9A3E69161678}" type="datetimeFigureOut">
               <a:rPr lang="en-US" smtClean="0"/>
-              <a:t>7/20/2024</a:t>
+              <a:t>10/20/2024</a:t>
             </a:fld>
             <a:endParaRPr lang="en-US"/>
           </a:p>
@@ -6192,7 +6192,7 @@
           <a:p>
             <a:fld id="{846CE7D5-CF57-46EF-B807-FDD0502418D4}" type="datetimeFigureOut">
               <a:rPr lang="en-US" smtClean="0"/>
-              <a:t>7/20/2024</a:t>
+              <a:t>10/20/2024</a:t>
             </a:fld>
             <a:endParaRPr lang="en-US"/>
           </a:p>
@@ -6398,7 +6398,7 @@
           <a:p>
             <a:fld id="{846CE7D5-CF57-46EF-B807-FDD0502418D4}" type="datetimeFigureOut">
               <a:rPr lang="en-US" smtClean="0"/>
-              <a:t>7/20/2024</a:t>
+              <a:t>10/20/2024</a:t>
             </a:fld>
             <a:endParaRPr lang="en-US"/>
           </a:p>
@@ -6614,7 +6614,7 @@
           <a:p>
             <a:fld id="{846CE7D5-CF57-46EF-B807-FDD0502418D4}" type="datetimeFigureOut">
               <a:rPr lang="en-US" smtClean="0"/>
-              <a:t>7/20/2024</a:t>
+              <a:t>10/20/2024</a:t>
             </a:fld>
             <a:endParaRPr lang="en-US"/>
           </a:p>
@@ -6820,7 +6820,7 @@
           <a:p>
             <a:fld id="{846CE7D5-CF57-46EF-B807-FDD0502418D4}" type="datetimeFigureOut">
               <a:rPr lang="en-US" smtClean="0"/>
-              <a:t>7/20/2024</a:t>
+              <a:t>10/20/2024</a:t>
             </a:fld>
             <a:endParaRPr lang="en-US"/>
           </a:p>
@@ -7102,7 +7102,7 @@
           <a:p>
             <a:fld id="{846CE7D5-CF57-46EF-B807-FDD0502418D4}" type="datetimeFigureOut">
               <a:rPr lang="en-US" smtClean="0"/>
-              <a:t>7/20/2024</a:t>
+              <a:t>10/20/2024</a:t>
             </a:fld>
             <a:endParaRPr lang="en-US"/>
           </a:p>
@@ -7370,7 +7370,7 @@
           <a:p>
             <a:fld id="{846CE7D5-CF57-46EF-B807-FDD0502418D4}" type="datetimeFigureOut">
               <a:rPr lang="en-US" smtClean="0"/>
-              <a:t>7/20/2024</a:t>
+              <a:t>10/20/2024</a:t>
             </a:fld>
             <a:endParaRPr lang="en-US"/>
           </a:p>
@@ -7773,7 +7773,7 @@
           <a:p>
             <a:fld id="{846CE7D5-CF57-46EF-B807-FDD0502418D4}" type="datetimeFigureOut">
               <a:rPr lang="en-US" smtClean="0"/>
-              <a:t>7/20/2024</a:t>
+              <a:t>10/20/2024</a:t>
             </a:fld>
             <a:endParaRPr lang="en-US"/>
           </a:p>
@@ -7927,7 +7927,7 @@
           <a:p>
             <a:fld id="{846CE7D5-CF57-46EF-B807-FDD0502418D4}" type="datetimeFigureOut">
               <a:rPr lang="en-US" smtClean="0"/>
-              <a:t>7/20/2024</a:t>
+              <a:t>10/20/2024</a:t>
             </a:fld>
             <a:endParaRPr lang="en-US"/>
           </a:p>
@@ -8058,7 +8058,7 @@
           <a:p>
             <a:fld id="{846CE7D5-CF57-46EF-B807-FDD0502418D4}" type="datetimeFigureOut">
               <a:rPr lang="en-US" smtClean="0"/>
-              <a:t>7/20/2024</a:t>
+              <a:t>10/20/2024</a:t>
             </a:fld>
             <a:endParaRPr lang="en-US"/>
           </a:p>
@@ -8371,7 +8371,7 @@
           <a:p>
             <a:fld id="{846CE7D5-CF57-46EF-B807-FDD0502418D4}" type="datetimeFigureOut">
               <a:rPr lang="en-US" smtClean="0"/>
-              <a:t>7/20/2024</a:t>
+              <a:t>10/20/2024</a:t>
             </a:fld>
             <a:endParaRPr lang="en-US"/>
           </a:p>
@@ -8664,7 +8664,7 @@
           <a:p>
             <a:fld id="{846CE7D5-CF57-46EF-B807-FDD0502418D4}" type="datetimeFigureOut">
               <a:rPr lang="en-US" smtClean="0"/>
-              <a:t>7/20/2024</a:t>
+              <a:t>10/20/2024</a:t>
             </a:fld>
             <a:endParaRPr lang="en-US"/>
           </a:p>
@@ -8913,7 +8913,7 @@
           <a:p>
             <a:fld id="{846CE7D5-CF57-46EF-B807-FDD0502418D4}" type="datetimeFigureOut">
               <a:rPr lang="en-US" smtClean="0"/>
-              <a:t>7/20/2024</a:t>
+              <a:t>10/20/2024</a:t>
             </a:fld>
             <a:endParaRPr lang="en-US"/>
           </a:p>
@@ -10562,7 +10562,7 @@
             <p:ph idx="1"/>
             <p:extLst>
               <p:ext uri="{D42A27DB-BD31-4B8C-83A1-F6EECF244321}">
-                <p14:modId xmlns:p14="http://schemas.microsoft.com/office/powerpoint/2010/main" val="4243001114"/>
+                <p14:modId xmlns:p14="http://schemas.microsoft.com/office/powerpoint/2010/main" val="3147949896"/>
               </p:ext>
             </p:extLst>
           </p:nvPr>

</xml_diff>